<commit_message>
final version of presentatino
</commit_message>
<xml_diff>
--- a/OpenGl.pptx
+++ b/OpenGl.pptx
@@ -8,9 +8,11 @@
     <p:sldId id="256" r:id="rId2"/>
     <p:sldId id="257" r:id="rId3"/>
     <p:sldId id="258" r:id="rId4"/>
-    <p:sldId id="259" r:id="rId5"/>
-    <p:sldId id="260" r:id="rId6"/>
-    <p:sldId id="262" r:id="rId7"/>
+    <p:sldId id="263" r:id="rId5"/>
+    <p:sldId id="259" r:id="rId6"/>
+    <p:sldId id="260" r:id="rId7"/>
+    <p:sldId id="262" r:id="rId8"/>
+    <p:sldId id="264" r:id="rId9"/>
   </p:sldIdLst>
   <p:sldSz cx="12192000" cy="6858000"/>
   <p:notesSz cx="6858000" cy="9144000"/>
@@ -123,6 +125,7 @@
     <p1510:client id="{246C33C7-7F58-0A81-7C41-27F5F76B9D75}" v="1" dt="2025-03-30T17:09:10.761"/>
     <p1510:client id="{2A37E0FD-50F0-AE1F-D03C-E901923920DF}" v="6" dt="2025-03-30T17:04:44.465"/>
     <p1510:client id="{555A54B7-3BCA-877D-03EB-98A2F8F0B330}" v="272" dt="2025-03-30T17:11:06.543"/>
+    <p1510:client id="{B11A2370-9279-8E4F-82CF-14AE25B41350}" v="853" dt="2025-03-31T16:09:10.036"/>
   </p1510:revLst>
 </p1510:revInfo>
 </file>
@@ -1771,6 +1774,634 @@
             <ac:spMk id="3" creationId="{E5BEB97C-2984-6913-05A6-5779F4D8DEFD}"/>
           </ac:spMkLst>
         </pc:spChg>
+      </pc:sldChg>
+    </pc:docChg>
+  </pc:docChgLst>
+  <pc:docChgLst>
+    <pc:chgData name="Дима Вотинцев" userId="f3cd587c4b411c69" providerId="Windows Live" clId="Web-{B11A2370-9279-8E4F-82CF-14AE25B41350}"/>
+    <pc:docChg chg="addSld modSld">
+      <pc:chgData name="Дима Вотинцев" userId="f3cd587c4b411c69" providerId="Windows Live" clId="Web-{B11A2370-9279-8E4F-82CF-14AE25B41350}" dt="2025-03-31T16:09:10.036" v="776"/>
+      <pc:docMkLst>
+        <pc:docMk/>
+      </pc:docMkLst>
+      <pc:sldChg chg="modSp">
+        <pc:chgData name="Дима Вотинцев" userId="f3cd587c4b411c69" providerId="Windows Live" clId="Web-{B11A2370-9279-8E4F-82CF-14AE25B41350}" dt="2025-03-31T16:07:29.970" v="770" actId="20577"/>
+        <pc:sldMkLst>
+          <pc:docMk/>
+          <pc:sldMk cId="3029759433" sldId="257"/>
+        </pc:sldMkLst>
+        <pc:spChg chg="mod">
+          <ac:chgData name="Дима Вотинцев" userId="f3cd587c4b411c69" providerId="Windows Live" clId="Web-{B11A2370-9279-8E4F-82CF-14AE25B41350}" dt="2025-03-31T16:07:29.970" v="770" actId="20577"/>
+          <ac:spMkLst>
+            <pc:docMk/>
+            <pc:sldMk cId="3029759433" sldId="257"/>
+            <ac:spMk id="3" creationId="{5E5C408B-0CFB-3401-7E44-9215A21BA7B7}"/>
+          </ac:spMkLst>
+        </pc:spChg>
+      </pc:sldChg>
+      <pc:sldChg chg="addSp delSp modSp">
+        <pc:chgData name="Дима Вотинцев" userId="f3cd587c4b411c69" providerId="Windows Live" clId="Web-{B11A2370-9279-8E4F-82CF-14AE25B41350}" dt="2025-03-31T16:05:21.841" v="750"/>
+        <pc:sldMkLst>
+          <pc:docMk/>
+          <pc:sldMk cId="3412704389" sldId="258"/>
+        </pc:sldMkLst>
+        <pc:spChg chg="mod">
+          <ac:chgData name="Дима Вотинцев" userId="f3cd587c4b411c69" providerId="Windows Live" clId="Web-{B11A2370-9279-8E4F-82CF-14AE25B41350}" dt="2025-03-31T15:40:00.372" v="650" actId="14100"/>
+          <ac:spMkLst>
+            <pc:docMk/>
+            <pc:sldMk cId="3412704389" sldId="258"/>
+            <ac:spMk id="2" creationId="{9C9BA85F-4A6E-117B-51BD-B5718E87D684}"/>
+          </ac:spMkLst>
+        </pc:spChg>
+        <pc:spChg chg="mod">
+          <ac:chgData name="Дима Вотинцев" userId="f3cd587c4b411c69" providerId="Windows Live" clId="Web-{B11A2370-9279-8E4F-82CF-14AE25B41350}" dt="2025-03-31T15:58:56.251" v="689" actId="14100"/>
+          <ac:spMkLst>
+            <pc:docMk/>
+            <pc:sldMk cId="3412704389" sldId="258"/>
+            <ac:spMk id="3" creationId="{48AB8EDC-3569-9B55-769E-C7790770F5C2}"/>
+          </ac:spMkLst>
+        </pc:spChg>
+        <pc:spChg chg="add del">
+          <ac:chgData name="Дима Вотинцев" userId="f3cd587c4b411c69" providerId="Windows Live" clId="Web-{B11A2370-9279-8E4F-82CF-14AE25B41350}" dt="2025-03-31T15:15:54.389" v="199"/>
+          <ac:spMkLst>
+            <pc:docMk/>
+            <pc:sldMk cId="3412704389" sldId="258"/>
+            <ac:spMk id="4" creationId="{4B36E191-347B-0D19-3038-9C97E7B09369}"/>
+          </ac:spMkLst>
+        </pc:spChg>
+        <pc:spChg chg="add mod">
+          <ac:chgData name="Дима Вотинцев" userId="f3cd587c4b411c69" providerId="Windows Live" clId="Web-{B11A2370-9279-8E4F-82CF-14AE25B41350}" dt="2025-03-31T16:05:20.075" v="749"/>
+          <ac:spMkLst>
+            <pc:docMk/>
+            <pc:sldMk cId="3412704389" sldId="258"/>
+            <ac:spMk id="6" creationId="{F23A8FCF-4217-60E2-83BF-0C87E14B71E7}"/>
+          </ac:spMkLst>
+        </pc:spChg>
+        <pc:spChg chg="add mod">
+          <ac:chgData name="Дима Вотинцев" userId="f3cd587c4b411c69" providerId="Windows Live" clId="Web-{B11A2370-9279-8E4F-82CF-14AE25B41350}" dt="2025-03-31T15:57:56.952" v="686" actId="14100"/>
+          <ac:spMkLst>
+            <pc:docMk/>
+            <pc:sldMk cId="3412704389" sldId="258"/>
+            <ac:spMk id="8" creationId="{6E6DEDB6-0AEC-430D-2395-192C222FFDB5}"/>
+          </ac:spMkLst>
+        </pc:spChg>
+        <pc:spChg chg="add mod">
+          <ac:chgData name="Дима Вотинцев" userId="f3cd587c4b411c69" providerId="Windows Live" clId="Web-{B11A2370-9279-8E4F-82CF-14AE25B41350}" dt="2025-03-31T15:58:00.171" v="687" actId="1076"/>
+          <ac:spMkLst>
+            <pc:docMk/>
+            <pc:sldMk cId="3412704389" sldId="258"/>
+            <ac:spMk id="9" creationId="{AC9C64B5-F5A2-9C66-D8C9-6693CEC930FB}"/>
+          </ac:spMkLst>
+        </pc:spChg>
+        <pc:spChg chg="add mod">
+          <ac:chgData name="Дима Вотинцев" userId="f3cd587c4b411c69" providerId="Windows Live" clId="Web-{B11A2370-9279-8E4F-82CF-14AE25B41350}" dt="2025-03-31T15:59:43.143" v="694" actId="1076"/>
+          <ac:spMkLst>
+            <pc:docMk/>
+            <pc:sldMk cId="3412704389" sldId="258"/>
+            <ac:spMk id="10" creationId="{E024D997-0E0A-D522-F6A8-912A5E87778A}"/>
+          </ac:spMkLst>
+        </pc:spChg>
+        <pc:spChg chg="add mod">
+          <ac:chgData name="Дима Вотинцев" userId="f3cd587c4b411c69" providerId="Windows Live" clId="Web-{B11A2370-9279-8E4F-82CF-14AE25B41350}" dt="2025-03-31T15:37:06.350" v="589" actId="1076"/>
+          <ac:spMkLst>
+            <pc:docMk/>
+            <pc:sldMk cId="3412704389" sldId="258"/>
+            <ac:spMk id="11" creationId="{AEA03E43-FC7F-1E08-4BE4-4A53CAE48422}"/>
+          </ac:spMkLst>
+        </pc:spChg>
+        <pc:spChg chg="add del mod">
+          <ac:chgData name="Дима Вотинцев" userId="f3cd587c4b411c69" providerId="Windows Live" clId="Web-{B11A2370-9279-8E4F-82CF-14AE25B41350}" dt="2025-03-31T15:26:29.440" v="372"/>
+          <ac:spMkLst>
+            <pc:docMk/>
+            <pc:sldMk cId="3412704389" sldId="258"/>
+            <ac:spMk id="12" creationId="{8F57E832-B60B-2149-D9B0-AA7DEDED7D46}"/>
+          </ac:spMkLst>
+        </pc:spChg>
+        <pc:spChg chg="add del mod">
+          <ac:chgData name="Дима Вотинцев" userId="f3cd587c4b411c69" providerId="Windows Live" clId="Web-{B11A2370-9279-8E4F-82CF-14AE25B41350}" dt="2025-03-31T15:19:41.161" v="294"/>
+          <ac:spMkLst>
+            <pc:docMk/>
+            <pc:sldMk cId="3412704389" sldId="258"/>
+            <ac:spMk id="13" creationId="{692E0402-EABA-7270-964C-67A9CD9A9CC6}"/>
+          </ac:spMkLst>
+        </pc:spChg>
+        <pc:spChg chg="add del">
+          <ac:chgData name="Дима Вотинцев" userId="f3cd587c4b411c69" providerId="Windows Live" clId="Web-{B11A2370-9279-8E4F-82CF-14AE25B41350}" dt="2025-03-31T15:19:45.615" v="296"/>
+          <ac:spMkLst>
+            <pc:docMk/>
+            <pc:sldMk cId="3412704389" sldId="258"/>
+            <ac:spMk id="14" creationId="{06A9E72D-7D61-7CD1-005C-133934BE557E}"/>
+          </ac:spMkLst>
+        </pc:spChg>
+        <pc:spChg chg="add del mod">
+          <ac:chgData name="Дима Вотинцев" userId="f3cd587c4b411c69" providerId="Windows Live" clId="Web-{B11A2370-9279-8E4F-82CF-14AE25B41350}" dt="2025-03-31T15:26:23.502" v="369"/>
+          <ac:spMkLst>
+            <pc:docMk/>
+            <pc:sldMk cId="3412704389" sldId="258"/>
+            <ac:spMk id="15" creationId="{2E59C152-9EC8-0CE8-D7AD-8CB95C43EDAA}"/>
+          </ac:spMkLst>
+        </pc:spChg>
+        <pc:spChg chg="add del mod">
+          <ac:chgData name="Дима Вотинцев" userId="f3cd587c4b411c69" providerId="Windows Live" clId="Web-{B11A2370-9279-8E4F-82CF-14AE25B41350}" dt="2025-03-31T15:36:53.788" v="583"/>
+          <ac:spMkLst>
+            <pc:docMk/>
+            <pc:sldMk cId="3412704389" sldId="258"/>
+            <ac:spMk id="17" creationId="{FB6E9C11-058D-D06F-A3F6-412E7F47BB69}"/>
+          </ac:spMkLst>
+        </pc:spChg>
+        <pc:spChg chg="add del mod">
+          <ac:chgData name="Дима Вотинцев" userId="f3cd587c4b411c69" providerId="Windows Live" clId="Web-{B11A2370-9279-8E4F-82CF-14AE25B41350}" dt="2025-03-31T15:27:02.238" v="384"/>
+          <ac:spMkLst>
+            <pc:docMk/>
+            <pc:sldMk cId="3412704389" sldId="258"/>
+            <ac:spMk id="18" creationId="{CE79AC13-065D-9B20-B18A-3C936AB6F719}"/>
+          </ac:spMkLst>
+        </pc:spChg>
+        <pc:spChg chg="add del mod">
+          <ac:chgData name="Дима Вотинцев" userId="f3cd587c4b411c69" providerId="Windows Live" clId="Web-{B11A2370-9279-8E4F-82CF-14AE25B41350}" dt="2025-03-31T15:26:27.502" v="371"/>
+          <ac:spMkLst>
+            <pc:docMk/>
+            <pc:sldMk cId="3412704389" sldId="258"/>
+            <ac:spMk id="19" creationId="{22F29E49-3052-2123-4308-0A4E597E2667}"/>
+          </ac:spMkLst>
+        </pc:spChg>
+        <pc:spChg chg="add del mod">
+          <ac:chgData name="Дима Вотинцев" userId="f3cd587c4b411c69" providerId="Windows Live" clId="Web-{B11A2370-9279-8E4F-82CF-14AE25B41350}" dt="2025-03-31T15:23:55.435" v="347"/>
+          <ac:spMkLst>
+            <pc:docMk/>
+            <pc:sldMk cId="3412704389" sldId="258"/>
+            <ac:spMk id="20" creationId="{912EC2F8-DADB-18B1-F9FE-BEA19D72F382}"/>
+          </ac:spMkLst>
+        </pc:spChg>
+        <pc:spChg chg="add del mod ord">
+          <ac:chgData name="Дима Вотинцев" userId="f3cd587c4b411c69" providerId="Windows Live" clId="Web-{B11A2370-9279-8E4F-82CF-14AE25B41350}" dt="2025-03-31T15:39:09.276" v="632"/>
+          <ac:spMkLst>
+            <pc:docMk/>
+            <pc:sldMk cId="3412704389" sldId="258"/>
+            <ac:spMk id="21" creationId="{6739C666-19C8-3179-2FB5-62F50870CFC2}"/>
+          </ac:spMkLst>
+        </pc:spChg>
+        <pc:spChg chg="add del mod ord modVis">
+          <ac:chgData name="Дима Вотинцев" userId="f3cd587c4b411c69" providerId="Windows Live" clId="Web-{B11A2370-9279-8E4F-82CF-14AE25B41350}" dt="2025-03-31T15:39:08.542" v="631"/>
+          <ac:spMkLst>
+            <pc:docMk/>
+            <pc:sldMk cId="3412704389" sldId="258"/>
+            <ac:spMk id="22" creationId="{D5BAA9C8-E60B-CA69-C87A-476C27E0B8DA}"/>
+          </ac:spMkLst>
+        </pc:spChg>
+        <pc:spChg chg="add del mod ord">
+          <ac:chgData name="Дима Вотинцев" userId="f3cd587c4b411c69" providerId="Windows Live" clId="Web-{B11A2370-9279-8E4F-82CF-14AE25B41350}" dt="2025-03-31T15:39:06.245" v="628"/>
+          <ac:spMkLst>
+            <pc:docMk/>
+            <pc:sldMk cId="3412704389" sldId="258"/>
+            <ac:spMk id="23" creationId="{7C93F7AE-909D-218A-0F54-87D5F6F846E7}"/>
+          </ac:spMkLst>
+        </pc:spChg>
+        <pc:spChg chg="add del mod ord">
+          <ac:chgData name="Дима Вотинцев" userId="f3cd587c4b411c69" providerId="Windows Live" clId="Web-{B11A2370-9279-8E4F-82CF-14AE25B41350}" dt="2025-03-31T15:39:05.682" v="627"/>
+          <ac:spMkLst>
+            <pc:docMk/>
+            <pc:sldMk cId="3412704389" sldId="258"/>
+            <ac:spMk id="24" creationId="{953FE9E9-F3A1-3951-6D2A-06CFA48DE533}"/>
+          </ac:spMkLst>
+        </pc:spChg>
+        <pc:spChg chg="add del mod">
+          <ac:chgData name="Дима Вотинцев" userId="f3cd587c4b411c69" providerId="Windows Live" clId="Web-{B11A2370-9279-8E4F-82CF-14AE25B41350}" dt="2025-03-31T15:36:54.397" v="584"/>
+          <ac:spMkLst>
+            <pc:docMk/>
+            <pc:sldMk cId="3412704389" sldId="258"/>
+            <ac:spMk id="25" creationId="{8B005F18-A448-0D19-3B59-5B936AC78572}"/>
+          </ac:spMkLst>
+        </pc:spChg>
+        <pc:spChg chg="add del mod">
+          <ac:chgData name="Дима Вотинцев" userId="f3cd587c4b411c69" providerId="Windows Live" clId="Web-{B11A2370-9279-8E4F-82CF-14AE25B41350}" dt="2025-03-31T15:27:37.364" v="416"/>
+          <ac:spMkLst>
+            <pc:docMk/>
+            <pc:sldMk cId="3412704389" sldId="258"/>
+            <ac:spMk id="26" creationId="{E359EECF-4C89-4A3C-549A-92C717E26CA5}"/>
+          </ac:spMkLst>
+        </pc:spChg>
+        <pc:spChg chg="add del mod">
+          <ac:chgData name="Дима Вотинцев" userId="f3cd587c4b411c69" providerId="Windows Live" clId="Web-{B11A2370-9279-8E4F-82CF-14AE25B41350}" dt="2025-03-31T15:27:37.364" v="415"/>
+          <ac:spMkLst>
+            <pc:docMk/>
+            <pc:sldMk cId="3412704389" sldId="258"/>
+            <ac:spMk id="27" creationId="{CAEDD470-E252-4AD3-FA0D-CC7E48E4A7C1}"/>
+          </ac:spMkLst>
+        </pc:spChg>
+        <pc:spChg chg="add del mod">
+          <ac:chgData name="Дима Вотинцев" userId="f3cd587c4b411c69" providerId="Windows Live" clId="Web-{B11A2370-9279-8E4F-82CF-14AE25B41350}" dt="2025-03-31T15:27:37.364" v="414"/>
+          <ac:spMkLst>
+            <pc:docMk/>
+            <pc:sldMk cId="3412704389" sldId="258"/>
+            <ac:spMk id="28" creationId="{42B2CA2A-27BB-E7AC-2211-3001A23A811F}"/>
+          </ac:spMkLst>
+        </pc:spChg>
+        <pc:spChg chg="add del mod">
+          <ac:chgData name="Дима Вотинцев" userId="f3cd587c4b411c69" providerId="Windows Live" clId="Web-{B11A2370-9279-8E4F-82CF-14AE25B41350}" dt="2025-03-31T15:27:37.364" v="413"/>
+          <ac:spMkLst>
+            <pc:docMk/>
+            <pc:sldMk cId="3412704389" sldId="258"/>
+            <ac:spMk id="29" creationId="{01F96D9C-C978-0C34-9CB7-66180A00779E}"/>
+          </ac:spMkLst>
+        </pc:spChg>
+        <pc:spChg chg="add del mod">
+          <ac:chgData name="Дима Вотинцев" userId="f3cd587c4b411c69" providerId="Windows Live" clId="Web-{B11A2370-9279-8E4F-82CF-14AE25B41350}" dt="2025-03-31T15:27:37.364" v="412"/>
+          <ac:spMkLst>
+            <pc:docMk/>
+            <pc:sldMk cId="3412704389" sldId="258"/>
+            <ac:spMk id="30" creationId="{2B838CB0-1A2E-FABC-F1BC-25A524F2F14D}"/>
+          </ac:spMkLst>
+        </pc:spChg>
+        <pc:spChg chg="add del mod">
+          <ac:chgData name="Дима Вотинцев" userId="f3cd587c4b411c69" providerId="Windows Live" clId="Web-{B11A2370-9279-8E4F-82CF-14AE25B41350}" dt="2025-03-31T15:27:37.364" v="411"/>
+          <ac:spMkLst>
+            <pc:docMk/>
+            <pc:sldMk cId="3412704389" sldId="258"/>
+            <ac:spMk id="31" creationId="{819DB923-2EDD-B9F4-798B-1415031207B0}"/>
+          </ac:spMkLst>
+        </pc:spChg>
+        <pc:spChg chg="add del mod">
+          <ac:chgData name="Дима Вотинцев" userId="f3cd587c4b411c69" providerId="Windows Live" clId="Web-{B11A2370-9279-8E4F-82CF-14AE25B41350}" dt="2025-03-31T15:27:37.364" v="410"/>
+          <ac:spMkLst>
+            <pc:docMk/>
+            <pc:sldMk cId="3412704389" sldId="258"/>
+            <ac:spMk id="32" creationId="{C7FB5C0F-E190-9C94-DBA3-AB32B1361251}"/>
+          </ac:spMkLst>
+        </pc:spChg>
+        <pc:spChg chg="add del mod">
+          <ac:chgData name="Дима Вотинцев" userId="f3cd587c4b411c69" providerId="Windows Live" clId="Web-{B11A2370-9279-8E4F-82CF-14AE25B41350}" dt="2025-03-31T15:27:37.364" v="409"/>
+          <ac:spMkLst>
+            <pc:docMk/>
+            <pc:sldMk cId="3412704389" sldId="258"/>
+            <ac:spMk id="33" creationId="{95335C46-0A42-91E0-6AB5-D921CF8ED9FF}"/>
+          </ac:spMkLst>
+        </pc:spChg>
+        <pc:spChg chg="add mod">
+          <ac:chgData name="Дима Вотинцев" userId="f3cd587c4b411c69" providerId="Windows Live" clId="Web-{B11A2370-9279-8E4F-82CF-14AE25B41350}" dt="2025-03-31T16:05:21.841" v="750"/>
+          <ac:spMkLst>
+            <pc:docMk/>
+            <pc:sldMk cId="3412704389" sldId="258"/>
+            <ac:spMk id="34" creationId="{81F8C4F9-9F25-235D-BBFC-288A1B6254D1}"/>
+          </ac:spMkLst>
+        </pc:spChg>
+        <pc:spChg chg="add mod">
+          <ac:chgData name="Дима Вотинцев" userId="f3cd587c4b411c69" providerId="Windows Live" clId="Web-{B11A2370-9279-8E4F-82CF-14AE25B41350}" dt="2025-03-31T15:59:36.768" v="693" actId="14100"/>
+          <ac:spMkLst>
+            <pc:docMk/>
+            <pc:sldMk cId="3412704389" sldId="258"/>
+            <ac:spMk id="35" creationId="{3182F7D2-2F43-65FB-8449-AFA86758ACE0}"/>
+          </ac:spMkLst>
+        </pc:spChg>
+        <pc:spChg chg="add mod">
+          <ac:chgData name="Дима Вотинцев" userId="f3cd587c4b411c69" providerId="Windows Live" clId="Web-{B11A2370-9279-8E4F-82CF-14AE25B41350}" dt="2025-03-31T15:59:33.143" v="692" actId="1076"/>
+          <ac:spMkLst>
+            <pc:docMk/>
+            <pc:sldMk cId="3412704389" sldId="258"/>
+            <ac:spMk id="36" creationId="{AF8C2A9F-066F-B4AC-B4F0-7C8A7A652E54}"/>
+          </ac:spMkLst>
+        </pc:spChg>
+        <pc:spChg chg="add mod">
+          <ac:chgData name="Дима Вотинцев" userId="f3cd587c4b411c69" providerId="Windows Live" clId="Web-{B11A2370-9279-8E4F-82CF-14AE25B41350}" dt="2025-03-31T15:37:06.444" v="595" actId="1076"/>
+          <ac:spMkLst>
+            <pc:docMk/>
+            <pc:sldMk cId="3412704389" sldId="258"/>
+            <ac:spMk id="37" creationId="{729210E6-0C9B-4CD7-DD6D-7F957841ECD0}"/>
+          </ac:spMkLst>
+        </pc:spChg>
+        <pc:spChg chg="add del mod">
+          <ac:chgData name="Дима Вотинцев" userId="f3cd587c4b411c69" providerId="Windows Live" clId="Web-{B11A2370-9279-8E4F-82CF-14AE25B41350}" dt="2025-03-31T15:29:59.978" v="464"/>
+          <ac:spMkLst>
+            <pc:docMk/>
+            <pc:sldMk cId="3412704389" sldId="258"/>
+            <ac:spMk id="38" creationId="{8D346A43-BDF5-9567-DA43-5622CCF7073C}"/>
+          </ac:spMkLst>
+        </pc:spChg>
+        <pc:spChg chg="add mod">
+          <ac:chgData name="Дима Вотинцев" userId="f3cd587c4b411c69" providerId="Windows Live" clId="Web-{B11A2370-9279-8E4F-82CF-14AE25B41350}" dt="2025-03-31T15:39:32.996" v="643" actId="14100"/>
+          <ac:spMkLst>
+            <pc:docMk/>
+            <pc:sldMk cId="3412704389" sldId="258"/>
+            <ac:spMk id="39" creationId="{B02F06D2-4989-7E6E-6AA4-087F15C78C6F}"/>
+          </ac:spMkLst>
+        </pc:spChg>
+        <pc:spChg chg="add del mod">
+          <ac:chgData name="Дима Вотинцев" userId="f3cd587c4b411c69" providerId="Windows Live" clId="Web-{B11A2370-9279-8E4F-82CF-14AE25B41350}" dt="2025-03-31T15:39:07.573" v="629"/>
+          <ac:spMkLst>
+            <pc:docMk/>
+            <pc:sldMk cId="3412704389" sldId="258"/>
+            <ac:spMk id="40" creationId="{E9BE069D-0C4E-168C-5789-6E61E00655B0}"/>
+          </ac:spMkLst>
+        </pc:spChg>
+        <pc:spChg chg="add del mod">
+          <ac:chgData name="Дима Вотинцев" userId="f3cd587c4b411c69" providerId="Windows Live" clId="Web-{B11A2370-9279-8E4F-82CF-14AE25B41350}" dt="2025-03-31T15:39:07.870" v="630"/>
+          <ac:spMkLst>
+            <pc:docMk/>
+            <pc:sldMk cId="3412704389" sldId="258"/>
+            <ac:spMk id="41" creationId="{36B654D8-FE36-CBC2-0877-2DBA147E9DF8}"/>
+          </ac:spMkLst>
+        </pc:spChg>
+        <pc:spChg chg="add del mod">
+          <ac:chgData name="Дима Вотинцев" userId="f3cd587c4b411c69" providerId="Windows Live" clId="Web-{B11A2370-9279-8E4F-82CF-14AE25B41350}" dt="2025-03-31T15:29:55.259" v="462"/>
+          <ac:spMkLst>
+            <pc:docMk/>
+            <pc:sldMk cId="3412704389" sldId="258"/>
+            <ac:spMk id="42" creationId="{C8134645-2428-A9EA-D3BF-CCD2AE838784}"/>
+          </ac:spMkLst>
+        </pc:spChg>
+        <pc:spChg chg="add del mod">
+          <ac:chgData name="Дима Вотинцев" userId="f3cd587c4b411c69" providerId="Windows Live" clId="Web-{B11A2370-9279-8E4F-82CF-14AE25B41350}" dt="2025-03-31T15:29:17.539" v="456"/>
+          <ac:spMkLst>
+            <pc:docMk/>
+            <pc:sldMk cId="3412704389" sldId="258"/>
+            <ac:spMk id="43" creationId="{E8096444-A051-EE6A-2DD9-C7C6C13D5B9C}"/>
+          </ac:spMkLst>
+        </pc:spChg>
+        <pc:spChg chg="add del mod">
+          <ac:chgData name="Дима Вотинцев" userId="f3cd587c4b411c69" providerId="Windows Live" clId="Web-{B11A2370-9279-8E4F-82CF-14AE25B41350}" dt="2025-03-31T15:29:17.539" v="455"/>
+          <ac:spMkLst>
+            <pc:docMk/>
+            <pc:sldMk cId="3412704389" sldId="258"/>
+            <ac:spMk id="44" creationId="{57F42F69-AFA8-7A9C-7738-A7D21B39D962}"/>
+          </ac:spMkLst>
+        </pc:spChg>
+        <pc:spChg chg="add mod">
+          <ac:chgData name="Дима Вотинцев" userId="f3cd587c4b411c69" providerId="Windows Live" clId="Web-{B11A2370-9279-8E4F-82CF-14AE25B41350}" dt="2025-03-31T15:59:24.908" v="691" actId="14100"/>
+          <ac:spMkLst>
+            <pc:docMk/>
+            <pc:sldMk cId="3412704389" sldId="258"/>
+            <ac:spMk id="50" creationId="{F404C030-9A8A-6636-8E49-2244C2441FCC}"/>
+          </ac:spMkLst>
+        </pc:spChg>
+        <pc:spChg chg="add mod">
+          <ac:chgData name="Дима Вотинцев" userId="f3cd587c4b411c69" providerId="Windows Live" clId="Web-{B11A2370-9279-8E4F-82CF-14AE25B41350}" dt="2025-03-31T15:41:01.467" v="665" actId="1076"/>
+          <ac:spMkLst>
+            <pc:docMk/>
+            <pc:sldMk cId="3412704389" sldId="258"/>
+            <ac:spMk id="51" creationId="{ED262456-E56A-74DD-C984-46C6B42EB9D7}"/>
+          </ac:spMkLst>
+        </pc:spChg>
+        <pc:spChg chg="add mod">
+          <ac:chgData name="Дима Вотинцев" userId="f3cd587c4b411c69" providerId="Windows Live" clId="Web-{B11A2370-9279-8E4F-82CF-14AE25B41350}" dt="2025-03-31T15:39:17.714" v="636" actId="1076"/>
+          <ac:spMkLst>
+            <pc:docMk/>
+            <pc:sldMk cId="3412704389" sldId="258"/>
+            <ac:spMk id="52" creationId="{A3F0BAD8-77C0-B50F-197B-96B02886A988}"/>
+          </ac:spMkLst>
+        </pc:spChg>
+        <pc:spChg chg="add mod">
+          <ac:chgData name="Дима Вотинцев" userId="f3cd587c4b411c69" providerId="Windows Live" clId="Web-{B11A2370-9279-8E4F-82CF-14AE25B41350}" dt="2025-03-31T15:40:13.325" v="653" actId="1076"/>
+          <ac:spMkLst>
+            <pc:docMk/>
+            <pc:sldMk cId="3412704389" sldId="258"/>
+            <ac:spMk id="53" creationId="{39DCC8B3-030F-B0C1-3F06-4C41FC17F3A8}"/>
+          </ac:spMkLst>
+        </pc:spChg>
+        <pc:spChg chg="add mod">
+          <ac:chgData name="Дима Вотинцев" userId="f3cd587c4b411c69" providerId="Windows Live" clId="Web-{B11A2370-9279-8E4F-82CF-14AE25B41350}" dt="2025-03-31T15:39:36.824" v="645" actId="1076"/>
+          <ac:spMkLst>
+            <pc:docMk/>
+            <pc:sldMk cId="3412704389" sldId="258"/>
+            <ac:spMk id="54" creationId="{20A16EEA-D1E2-1C46-F03D-7F703061FE8A}"/>
+          </ac:spMkLst>
+        </pc:spChg>
+        <pc:spChg chg="add mod">
+          <ac:chgData name="Дима Вотинцев" userId="f3cd587c4b411c69" providerId="Windows Live" clId="Web-{B11A2370-9279-8E4F-82CF-14AE25B41350}" dt="2025-03-31T15:39:47.512" v="649" actId="1076"/>
+          <ac:spMkLst>
+            <pc:docMk/>
+            <pc:sldMk cId="3412704389" sldId="258"/>
+            <ac:spMk id="55" creationId="{A49F917A-FEFF-8B52-06B4-8F3E779656B7}"/>
+          </ac:spMkLst>
+        </pc:spChg>
+        <pc:spChg chg="add mod">
+          <ac:chgData name="Дима Вотинцев" userId="f3cd587c4b411c69" providerId="Windows Live" clId="Web-{B11A2370-9279-8E4F-82CF-14AE25B41350}" dt="2025-03-31T15:59:56.643" v="701" actId="1076"/>
+          <ac:spMkLst>
+            <pc:docMk/>
+            <pc:sldMk cId="3412704389" sldId="258"/>
+            <ac:spMk id="56" creationId="{1EB142DB-3417-572B-F4F6-8F9FD3BDF9FA}"/>
+          </ac:spMkLst>
+        </pc:spChg>
+        <pc:inkChg chg="add del">
+          <ac:chgData name="Дима Вотинцев" userId="f3cd587c4b411c69" providerId="Windows Live" clId="Web-{B11A2370-9279-8E4F-82CF-14AE25B41350}" dt="2025-03-31T15:31:31.246" v="484"/>
+          <ac:inkMkLst>
+            <pc:docMk/>
+            <pc:sldMk cId="3412704389" sldId="258"/>
+            <ac:inkMk id="45" creationId="{37B6493D-D2A6-DC20-F632-CE001859AA13}"/>
+          </ac:inkMkLst>
+        </pc:inkChg>
+        <pc:inkChg chg="add del">
+          <ac:chgData name="Дима Вотинцев" userId="f3cd587c4b411c69" providerId="Windows Live" clId="Web-{B11A2370-9279-8E4F-82CF-14AE25B41350}" dt="2025-03-31T15:31:31.246" v="483"/>
+          <ac:inkMkLst>
+            <pc:docMk/>
+            <pc:sldMk cId="3412704389" sldId="258"/>
+            <ac:inkMk id="46" creationId="{7E91127D-00C1-6B36-7F6B-750F4A1D4D96}"/>
+          </ac:inkMkLst>
+        </pc:inkChg>
+        <pc:inkChg chg="add del">
+          <ac:chgData name="Дима Вотинцев" userId="f3cd587c4b411c69" providerId="Windows Live" clId="Web-{B11A2370-9279-8E4F-82CF-14AE25B41350}" dt="2025-03-31T15:31:47.950" v="488"/>
+          <ac:inkMkLst>
+            <pc:docMk/>
+            <pc:sldMk cId="3412704389" sldId="258"/>
+            <ac:inkMk id="47" creationId="{1A691EFC-BBA8-5DF9-D09E-27202D8E9278}"/>
+          </ac:inkMkLst>
+        </pc:inkChg>
+        <pc:inkChg chg="add del">
+          <ac:chgData name="Дима Вотинцев" userId="f3cd587c4b411c69" providerId="Windows Live" clId="Web-{B11A2370-9279-8E4F-82CF-14AE25B41350}" dt="2025-03-31T15:31:41.153" v="487"/>
+          <ac:inkMkLst>
+            <pc:docMk/>
+            <pc:sldMk cId="3412704389" sldId="258"/>
+            <ac:inkMk id="48" creationId="{14DDE006-78DE-9717-7915-BE7C2140E2A1}"/>
+          </ac:inkMkLst>
+        </pc:inkChg>
+        <pc:inkChg chg="add del">
+          <ac:chgData name="Дима Вотинцев" userId="f3cd587c4b411c69" providerId="Windows Live" clId="Web-{B11A2370-9279-8E4F-82CF-14AE25B41350}" dt="2025-03-31T15:32:18.545" v="490"/>
+          <ac:inkMkLst>
+            <pc:docMk/>
+            <pc:sldMk cId="3412704389" sldId="258"/>
+            <ac:inkMk id="49" creationId="{B9FC6AB3-ACD1-39FC-7185-FCF35C0D1BCF}"/>
+          </ac:inkMkLst>
+        </pc:inkChg>
+      </pc:sldChg>
+      <pc:sldChg chg="addSp delSp modSp">
+        <pc:chgData name="Дима Вотинцев" userId="f3cd587c4b411c69" providerId="Windows Live" clId="Web-{B11A2370-9279-8E4F-82CF-14AE25B41350}" dt="2025-03-31T16:04:55.465" v="748"/>
+        <pc:sldMkLst>
+          <pc:docMk/>
+          <pc:sldMk cId="3710744054" sldId="260"/>
+        </pc:sldMkLst>
+        <pc:spChg chg="del mod">
+          <ac:chgData name="Дима Вотинцев" userId="f3cd587c4b411c69" providerId="Windows Live" clId="Web-{B11A2370-9279-8E4F-82CF-14AE25B41350}" dt="2025-03-31T16:03:29.556" v="728"/>
+          <ac:spMkLst>
+            <pc:docMk/>
+            <pc:sldMk cId="3710744054" sldId="260"/>
+            <ac:spMk id="3" creationId="{D9AACCFF-1218-7F99-07D1-528FED6B3373}"/>
+          </ac:spMkLst>
+        </pc:spChg>
+        <pc:spChg chg="add mod">
+          <ac:chgData name="Дима Вотинцев" userId="f3cd587c4b411c69" providerId="Windows Live" clId="Web-{B11A2370-9279-8E4F-82CF-14AE25B41350}" dt="2025-03-31T16:04:28.933" v="744"/>
+          <ac:spMkLst>
+            <pc:docMk/>
+            <pc:sldMk cId="3710744054" sldId="260"/>
+            <ac:spMk id="4" creationId="{D8E44A9D-AF57-1E02-D5C8-907582D64094}"/>
+          </ac:spMkLst>
+        </pc:spChg>
+        <pc:spChg chg="add del mod">
+          <ac:chgData name="Дима Вотинцев" userId="f3cd587c4b411c69" providerId="Windows Live" clId="Web-{B11A2370-9279-8E4F-82CF-14AE25B41350}" dt="2025-03-31T15:07:29.560" v="76"/>
+          <ac:spMkLst>
+            <pc:docMk/>
+            <pc:sldMk cId="3710744054" sldId="260"/>
+            <ac:spMk id="5" creationId="{5D29023D-B074-4ACC-EF7B-66920C1A9FC2}"/>
+          </ac:spMkLst>
+        </pc:spChg>
+        <pc:spChg chg="add del mod">
+          <ac:chgData name="Дима Вотинцев" userId="f3cd587c4b411c69" providerId="Windows Live" clId="Web-{B11A2370-9279-8E4F-82CF-14AE25B41350}" dt="2025-03-31T16:04:44.481" v="746"/>
+          <ac:spMkLst>
+            <pc:docMk/>
+            <pc:sldMk cId="3710744054" sldId="260"/>
+            <ac:spMk id="6" creationId="{1B0B7B7E-E342-745C-E504-E3E8DA1E9819}"/>
+          </ac:spMkLst>
+        </pc:spChg>
+        <pc:spChg chg="add del mod">
+          <ac:chgData name="Дима Вотинцев" userId="f3cd587c4b411c69" providerId="Windows Live" clId="Web-{B11A2370-9279-8E4F-82CF-14AE25B41350}" dt="2025-03-31T15:07:52.139" v="94"/>
+          <ac:spMkLst>
+            <pc:docMk/>
+            <pc:sldMk cId="3710744054" sldId="260"/>
+            <ac:spMk id="7" creationId="{FCF0BB77-3C0C-B30B-DD2C-6D9118755A96}"/>
+          </ac:spMkLst>
+        </pc:spChg>
+        <pc:spChg chg="add del mod">
+          <ac:chgData name="Дима Вотинцев" userId="f3cd587c4b411c69" providerId="Windows Live" clId="Web-{B11A2370-9279-8E4F-82CF-14AE25B41350}" dt="2025-03-31T15:07:21.779" v="66"/>
+          <ac:spMkLst>
+            <pc:docMk/>
+            <pc:sldMk cId="3710744054" sldId="260"/>
+            <ac:spMk id="8" creationId="{F406406E-95CE-B3BF-966A-31375E13AB83}"/>
+          </ac:spMkLst>
+        </pc:spChg>
+        <pc:spChg chg="add mod">
+          <ac:chgData name="Дима Вотинцев" userId="f3cd587c4b411c69" providerId="Windows Live" clId="Web-{B11A2370-9279-8E4F-82CF-14AE25B41350}" dt="2025-03-31T16:04:52.262" v="747"/>
+          <ac:spMkLst>
+            <pc:docMk/>
+            <pc:sldMk cId="3710744054" sldId="260"/>
+            <ac:spMk id="9" creationId="{3E06A21E-7A8F-0D4C-EAB9-0FFCF09299B1}"/>
+          </ac:spMkLst>
+        </pc:spChg>
+        <pc:spChg chg="add mod">
+          <ac:chgData name="Дима Вотинцев" userId="f3cd587c4b411c69" providerId="Windows Live" clId="Web-{B11A2370-9279-8E4F-82CF-14AE25B41350}" dt="2025-03-31T16:04:07.495" v="741" actId="688"/>
+          <ac:spMkLst>
+            <pc:docMk/>
+            <pc:sldMk cId="3710744054" sldId="260"/>
+            <ac:spMk id="11" creationId="{ADE83E86-6528-6FBC-3DEB-65E6F5C4A182}"/>
+          </ac:spMkLst>
+        </pc:spChg>
+        <pc:spChg chg="add mod">
+          <ac:chgData name="Дима Вотинцев" userId="f3cd587c4b411c69" providerId="Windows Live" clId="Web-{B11A2370-9279-8E4F-82CF-14AE25B41350}" dt="2025-03-31T16:04:10.339" v="742" actId="688"/>
+          <ac:spMkLst>
+            <pc:docMk/>
+            <pc:sldMk cId="3710744054" sldId="260"/>
+            <ac:spMk id="12" creationId="{FA7B4646-5048-3B4C-D1B6-3D12FB59EB1A}"/>
+          </ac:spMkLst>
+        </pc:spChg>
+        <pc:spChg chg="add del">
+          <ac:chgData name="Дима Вотинцев" userId="f3cd587c4b411c69" providerId="Windows Live" clId="Web-{B11A2370-9279-8E4F-82CF-14AE25B41350}" dt="2025-03-31T15:10:06.253" v="130"/>
+          <ac:spMkLst>
+            <pc:docMk/>
+            <pc:sldMk cId="3710744054" sldId="260"/>
+            <ac:spMk id="13" creationId="{1A027126-DCE1-E727-17D4-1A9DE4B0C599}"/>
+          </ac:spMkLst>
+        </pc:spChg>
+        <pc:spChg chg="add mod">
+          <ac:chgData name="Дима Вотинцев" userId="f3cd587c4b411c69" providerId="Windows Live" clId="Web-{B11A2370-9279-8E4F-82CF-14AE25B41350}" dt="2025-03-31T16:04:40.043" v="745"/>
+          <ac:spMkLst>
+            <pc:docMk/>
+            <pc:sldMk cId="3710744054" sldId="260"/>
+            <ac:spMk id="14" creationId="{99407776-2F61-4C26-E6E1-EAD63F22A242}"/>
+          </ac:spMkLst>
+        </pc:spChg>
+        <pc:spChg chg="add mod">
+          <ac:chgData name="Дима Вотинцев" userId="f3cd587c4b411c69" providerId="Windows Live" clId="Web-{B11A2370-9279-8E4F-82CF-14AE25B41350}" dt="2025-03-31T16:04:55.465" v="748"/>
+          <ac:spMkLst>
+            <pc:docMk/>
+            <pc:sldMk cId="3710744054" sldId="260"/>
+            <ac:spMk id="15" creationId="{6D807D57-E422-1199-3AAC-AF4CC094ED6F}"/>
+          </ac:spMkLst>
+        </pc:spChg>
+        <pc:spChg chg="add mod">
+          <ac:chgData name="Дима Вотинцев" userId="f3cd587c4b411c69" providerId="Windows Live" clId="Web-{B11A2370-9279-8E4F-82CF-14AE25B41350}" dt="2025-03-31T16:03:41.604" v="731" actId="20577"/>
+          <ac:spMkLst>
+            <pc:docMk/>
+            <pc:sldMk cId="3710744054" sldId="260"/>
+            <ac:spMk id="17" creationId="{3FC74E7E-F46B-E042-A59B-AE3E782CE5BF}"/>
+          </ac:spMkLst>
+        </pc:spChg>
+        <pc:spChg chg="add del mod">
+          <ac:chgData name="Дима Вотинцев" userId="f3cd587c4b411c69" providerId="Windows Live" clId="Web-{B11A2370-9279-8E4F-82CF-14AE25B41350}" dt="2025-03-31T16:03:32.619" v="729"/>
+          <ac:spMkLst>
+            <pc:docMk/>
+            <pc:sldMk cId="3710744054" sldId="260"/>
+            <ac:spMk id="19" creationId="{CF9FD263-671C-F41F-4242-68B215CE8115}"/>
+          </ac:spMkLst>
+        </pc:spChg>
+        <pc:cxnChg chg="add del mod">
+          <ac:chgData name="Дима Вотинцев" userId="f3cd587c4b411c69" providerId="Windows Live" clId="Web-{B11A2370-9279-8E4F-82CF-14AE25B41350}" dt="2025-03-31T15:09:12.423" v="118"/>
+          <ac:cxnSpMkLst>
+            <pc:docMk/>
+            <pc:sldMk cId="3710744054" sldId="260"/>
+            <ac:cxnSpMk id="10" creationId="{14C36A59-0300-C068-33FE-B80159249FC6}"/>
+          </ac:cxnSpMkLst>
+        </pc:cxnChg>
+      </pc:sldChg>
+      <pc:sldChg chg="modSp add replId">
+        <pc:chgData name="Дима Вотинцев" userId="f3cd587c4b411c69" providerId="Windows Live" clId="Web-{B11A2370-9279-8E4F-82CF-14AE25B41350}" dt="2025-03-31T15:15:37.091" v="192" actId="20577"/>
+        <pc:sldMkLst>
+          <pc:docMk/>
+          <pc:sldMk cId="3718848944" sldId="263"/>
+        </pc:sldMkLst>
+        <pc:spChg chg="mod">
+          <ac:chgData name="Дима Вотинцев" userId="f3cd587c4b411c69" providerId="Windows Live" clId="Web-{B11A2370-9279-8E4F-82CF-14AE25B41350}" dt="2025-03-31T15:15:37.091" v="192" actId="20577"/>
+          <ac:spMkLst>
+            <pc:docMk/>
+            <pc:sldMk cId="3718848944" sldId="263"/>
+            <ac:spMk id="3" creationId="{E1F6F640-6962-DCF4-FB19-679E1B1C51F9}"/>
+          </ac:spMkLst>
+        </pc:spChg>
+      </pc:sldChg>
+      <pc:sldChg chg="addSp delSp modSp add mod replId setBg">
+        <pc:chgData name="Дима Вотинцев" userId="f3cd587c4b411c69" providerId="Windows Live" clId="Web-{B11A2370-9279-8E4F-82CF-14AE25B41350}" dt="2025-03-31T16:09:10.036" v="776"/>
+        <pc:sldMkLst>
+          <pc:docMk/>
+          <pc:sldMk cId="863713459" sldId="264"/>
+        </pc:sldMkLst>
+        <pc:spChg chg="mod">
+          <ac:chgData name="Дима Вотинцев" userId="f3cd587c4b411c69" providerId="Windows Live" clId="Web-{B11A2370-9279-8E4F-82CF-14AE25B41350}" dt="2025-03-31T16:09:04.708" v="774" actId="20577"/>
+          <ac:spMkLst>
+            <pc:docMk/>
+            <pc:sldMk cId="863713459" sldId="264"/>
+            <ac:spMk id="2" creationId="{66F4BCC3-4A31-4AFB-4282-9CA5733D2A62}"/>
+          </ac:spMkLst>
+        </pc:spChg>
+        <pc:spChg chg="del mod">
+          <ac:chgData name="Дима Вотинцев" userId="f3cd587c4b411c69" providerId="Windows Live" clId="Web-{B11A2370-9279-8E4F-82CF-14AE25B41350}" dt="2025-03-31T15:44:02.895" v="679"/>
+          <ac:spMkLst>
+            <pc:docMk/>
+            <pc:sldMk cId="863713459" sldId="264"/>
+            <ac:spMk id="3" creationId="{1806884C-74D6-7983-8E17-30FAF6E83580}"/>
+          </ac:spMkLst>
+        </pc:spChg>
+        <pc:picChg chg="add del mod">
+          <ac:chgData name="Дима Вотинцев" userId="f3cd587c4b411c69" providerId="Windows Live" clId="Web-{B11A2370-9279-8E4F-82CF-14AE25B41350}" dt="2025-03-31T15:53:50.913" v="681"/>
+          <ac:picMkLst>
+            <pc:docMk/>
+            <pc:sldMk cId="863713459" sldId="264"/>
+            <ac:picMk id="4" creationId="{CBBE4C75-9802-AFAB-CE57-B41FF19096F9}"/>
+          </ac:picMkLst>
+        </pc:picChg>
+        <pc:picChg chg="add mod">
+          <ac:chgData name="Дима Вотинцев" userId="f3cd587c4b411c69" providerId="Windows Live" clId="Web-{B11A2370-9279-8E4F-82CF-14AE25B41350}" dt="2025-03-31T15:54:37.790" v="685" actId="1076"/>
+          <ac:picMkLst>
+            <pc:docMk/>
+            <pc:sldMk cId="863713459" sldId="264"/>
+            <ac:picMk id="5" creationId="{5F916700-29FC-FA05-7AAE-660784E842C4}"/>
+          </ac:picMkLst>
+        </pc:picChg>
       </pc:sldChg>
     </pc:docChg>
   </pc:docChgLst>
@@ -1906,7 +2537,7 @@
           <a:p>
             <a:fld id="{C764DE79-268F-4C1A-8933-263129D2AF90}" type="datetimeFigureOut">
               <a:rPr lang="en-US" dirty="0"/>
-              <a:t>3/30/2025</a:t>
+              <a:t>3/31/2025</a:t>
             </a:fld>
             <a:endParaRPr lang="en-US"/>
           </a:p>
@@ -2074,7 +2705,7 @@
           <a:p>
             <a:fld id="{C764DE79-268F-4C1A-8933-263129D2AF90}" type="datetimeFigureOut">
               <a:rPr lang="en-US" dirty="0"/>
-              <a:t>3/30/2025</a:t>
+              <a:t>3/31/2025</a:t>
             </a:fld>
             <a:endParaRPr lang="en-US"/>
           </a:p>
@@ -2252,7 +2883,7 @@
           <a:p>
             <a:fld id="{C764DE79-268F-4C1A-8933-263129D2AF90}" type="datetimeFigureOut">
               <a:rPr lang="en-US" dirty="0"/>
-              <a:t>3/30/2025</a:t>
+              <a:t>3/31/2025</a:t>
             </a:fld>
             <a:endParaRPr lang="en-US"/>
           </a:p>
@@ -2420,7 +3051,7 @@
           <a:p>
             <a:fld id="{C764DE79-268F-4C1A-8933-263129D2AF90}" type="datetimeFigureOut">
               <a:rPr lang="en-US" dirty="0"/>
-              <a:t>3/30/2025</a:t>
+              <a:t>3/31/2025</a:t>
             </a:fld>
             <a:endParaRPr lang="en-US"/>
           </a:p>
@@ -2665,7 +3296,7 @@
           <a:p>
             <a:fld id="{C764DE79-268F-4C1A-8933-263129D2AF90}" type="datetimeFigureOut">
               <a:rPr lang="en-US" dirty="0"/>
-              <a:t>3/30/2025</a:t>
+              <a:t>3/31/2025</a:t>
             </a:fld>
             <a:endParaRPr lang="en-US"/>
           </a:p>
@@ -2894,7 +3525,7 @@
           <a:p>
             <a:fld id="{C764DE79-268F-4C1A-8933-263129D2AF90}" type="datetimeFigureOut">
               <a:rPr lang="en-US" dirty="0"/>
-              <a:t>3/30/2025</a:t>
+              <a:t>3/31/2025</a:t>
             </a:fld>
             <a:endParaRPr lang="en-US"/>
           </a:p>
@@ -3258,7 +3889,7 @@
           <a:p>
             <a:fld id="{C764DE79-268F-4C1A-8933-263129D2AF90}" type="datetimeFigureOut">
               <a:rPr lang="en-US" dirty="0"/>
-              <a:t>3/30/2025</a:t>
+              <a:t>3/31/2025</a:t>
             </a:fld>
             <a:endParaRPr lang="en-US"/>
           </a:p>
@@ -3375,7 +4006,7 @@
           <a:p>
             <a:fld id="{C764DE79-268F-4C1A-8933-263129D2AF90}" type="datetimeFigureOut">
               <a:rPr lang="en-US" dirty="0"/>
-              <a:t>3/30/2025</a:t>
+              <a:t>3/31/2025</a:t>
             </a:fld>
             <a:endParaRPr lang="en-US"/>
           </a:p>
@@ -3470,7 +4101,7 @@
           <a:p>
             <a:fld id="{C764DE79-268F-4C1A-8933-263129D2AF90}" type="datetimeFigureOut">
               <a:rPr lang="en-US" dirty="0"/>
-              <a:t>3/30/2025</a:t>
+              <a:t>3/31/2025</a:t>
             </a:fld>
             <a:endParaRPr lang="en-US"/>
           </a:p>
@@ -3745,7 +4376,7 @@
           <a:p>
             <a:fld id="{C764DE79-268F-4C1A-8933-263129D2AF90}" type="datetimeFigureOut">
               <a:rPr lang="en-US" dirty="0"/>
-              <a:t>3/30/2025</a:t>
+              <a:t>3/31/2025</a:t>
             </a:fld>
             <a:endParaRPr lang="en-US"/>
           </a:p>
@@ -3997,7 +4628,7 @@
           <a:p>
             <a:fld id="{C764DE79-268F-4C1A-8933-263129D2AF90}" type="datetimeFigureOut">
               <a:rPr lang="en-US" dirty="0"/>
-              <a:t>3/30/2025</a:t>
+              <a:t>3/31/2025</a:t>
             </a:fld>
             <a:endParaRPr lang="en-US"/>
           </a:p>
@@ -4211,7 +4842,7 @@
           <a:p>
             <a:fld id="{C764DE79-268F-4C1A-8933-263129D2AF90}" type="datetimeFigureOut">
               <a:rPr lang="en-US" dirty="0"/>
-              <a:t>3/30/2025</a:t>
+              <a:t>3/31/2025</a:t>
             </a:fld>
             <a:endParaRPr lang="en-US"/>
           </a:p>
@@ -4836,8 +5467,8 @@
         </p:nvSpPr>
         <p:spPr>
           <a:xfrm>
-            <a:off x="84724" y="633500"/>
-            <a:ext cx="12102781" cy="6142649"/>
+            <a:off x="358452" y="936819"/>
+            <a:ext cx="11510937" cy="5254884"/>
           </a:xfrm>
         </p:spPr>
         <p:txBody>
@@ -4852,18 +5483,18 @@
               </a:lnSpc>
             </a:pPr>
             <a:r>
-              <a:rPr lang="ru-RU" sz="2800" b="1"/>
+              <a:rPr lang="ru-RU" b="1" dirty="0"/>
               <a:t>Разделяемые объекты</a:t>
             </a:r>
             <a:r>
-              <a:rPr lang="ru-RU" sz="2800"/>
+              <a:rPr lang="ru-RU" dirty="0"/>
               <a:t> - это ресурсы OpenGL, которые могут использоваться совместно несколькими </a:t>
             </a:r>
             <a:r>
-              <a:rPr lang="ru-RU" sz="2800" b="1"/>
+              <a:rPr lang="ru-RU" b="1" dirty="0"/>
               <a:t>контекстами.</a:t>
             </a:r>
-            <a:endParaRPr lang="ru-RU" sz="2800"/>
+            <a:endParaRPr lang="ru-RU" dirty="0"/>
           </a:p>
           <a:p>
             <a:pPr algn="l">
@@ -4872,7 +5503,7 @@
               </a:lnSpc>
             </a:pPr>
             <a:r>
-              <a:rPr lang="ru-RU" sz="2000"/>
+              <a:rPr lang="ru-RU" sz="2000" dirty="0"/>
               <a:t>(разделяемые объекты: </a:t>
             </a:r>
             <a:r>
@@ -4883,7 +5514,7 @@
               <a:t>buffer</a:t>
             </a:r>
             <a:r>
-              <a:rPr lang="ru-RU" sz="2000">
+              <a:rPr lang="ru-RU" sz="2000" dirty="0">
                 <a:ea typeface="+mn-lt"/>
                 <a:cs typeface="+mn-lt"/>
               </a:rPr>
@@ -4897,7 +5528,7 @@
               <a:t>objects</a:t>
             </a:r>
             <a:r>
-              <a:rPr lang="ru-RU" sz="2000">
+              <a:rPr lang="ru-RU" sz="2000" dirty="0">
                 <a:ea typeface="+mn-lt"/>
                 <a:cs typeface="+mn-lt"/>
               </a:rPr>
@@ -4911,7 +5542,7 @@
               <a:t>program</a:t>
             </a:r>
             <a:r>
-              <a:rPr lang="ru-RU" sz="2000">
+              <a:rPr lang="ru-RU" sz="2000" dirty="0">
                 <a:ea typeface="+mn-lt"/>
                 <a:cs typeface="+mn-lt"/>
               </a:rPr>
@@ -4925,7 +5556,7 @@
               <a:t>and</a:t>
             </a:r>
             <a:r>
-              <a:rPr lang="ru-RU" sz="2000">
+              <a:rPr lang="ru-RU" sz="2000" dirty="0">
                 <a:ea typeface="+mn-lt"/>
                 <a:cs typeface="+mn-lt"/>
               </a:rPr>
@@ -4939,7 +5570,7 @@
               <a:t>shader</a:t>
             </a:r>
             <a:r>
-              <a:rPr lang="ru-RU" sz="2000">
+              <a:rPr lang="ru-RU" sz="2000" dirty="0">
                 <a:ea typeface="+mn-lt"/>
                 <a:cs typeface="+mn-lt"/>
               </a:rPr>
@@ -4953,7 +5584,7 @@
               <a:t>objects</a:t>
             </a:r>
             <a:r>
-              <a:rPr lang="ru-RU" sz="2000">
+              <a:rPr lang="ru-RU" sz="2000" dirty="0">
                 <a:ea typeface="+mn-lt"/>
                 <a:cs typeface="+mn-lt"/>
               </a:rPr>
@@ -4967,7 +5598,7 @@
               <a:t>renderbuffer</a:t>
             </a:r>
             <a:r>
-              <a:rPr lang="ru-RU" sz="2000">
+              <a:rPr lang="ru-RU" sz="2000" dirty="0">
                 <a:ea typeface="+mn-lt"/>
                 <a:cs typeface="+mn-lt"/>
               </a:rPr>
@@ -4981,7 +5612,7 @@
               <a:t>objects</a:t>
             </a:r>
             <a:r>
-              <a:rPr lang="ru-RU" sz="2000">
+              <a:rPr lang="ru-RU" sz="2000" dirty="0">
                 <a:ea typeface="+mn-lt"/>
                 <a:cs typeface="+mn-lt"/>
               </a:rPr>
@@ -4995,7 +5626,7 @@
               <a:t>sampler</a:t>
             </a:r>
             <a:r>
-              <a:rPr lang="ru-RU" sz="2000">
+              <a:rPr lang="ru-RU" sz="2000" dirty="0">
                 <a:ea typeface="+mn-lt"/>
                 <a:cs typeface="+mn-lt"/>
               </a:rPr>
@@ -5009,7 +5640,7 @@
               <a:t>objects</a:t>
             </a:r>
             <a:r>
-              <a:rPr lang="ru-RU" sz="2000">
+              <a:rPr lang="ru-RU" sz="2000" dirty="0">
                 <a:ea typeface="+mn-lt"/>
                 <a:cs typeface="+mn-lt"/>
               </a:rPr>
@@ -5023,7 +5654,7 @@
               <a:t>sync</a:t>
             </a:r>
             <a:r>
-              <a:rPr lang="ru-RU" sz="2000">
+              <a:rPr lang="ru-RU" sz="2000" dirty="0">
                 <a:ea typeface="+mn-lt"/>
                 <a:cs typeface="+mn-lt"/>
               </a:rPr>
@@ -5037,7 +5668,7 @@
               <a:t>objects</a:t>
             </a:r>
             <a:r>
-              <a:rPr lang="ru-RU" sz="2000">
+              <a:rPr lang="ru-RU" sz="2000" dirty="0">
                 <a:ea typeface="+mn-lt"/>
                 <a:cs typeface="+mn-lt"/>
               </a:rPr>
@@ -5051,7 +5682,7 @@
               <a:t>and</a:t>
             </a:r>
             <a:r>
-              <a:rPr lang="ru-RU" sz="2000">
+              <a:rPr lang="ru-RU" sz="2000" dirty="0">
                 <a:ea typeface="+mn-lt"/>
                 <a:cs typeface="+mn-lt"/>
               </a:rPr>
@@ -5065,7 +5696,7 @@
               <a:t>texture</a:t>
             </a:r>
             <a:r>
-              <a:rPr lang="ru-RU" sz="2000">
+              <a:rPr lang="ru-RU" sz="2000" dirty="0">
                 <a:ea typeface="+mn-lt"/>
                 <a:cs typeface="+mn-lt"/>
               </a:rPr>
@@ -5079,7 +5710,7 @@
               <a:t>objects</a:t>
             </a:r>
             <a:r>
-              <a:rPr lang="ru-RU" sz="2000">
+              <a:rPr lang="ru-RU" sz="2000" dirty="0">
                 <a:ea typeface="+mn-lt"/>
                 <a:cs typeface="+mn-lt"/>
               </a:rPr>
@@ -5093,7 +5724,7 @@
               <a:t>zero</a:t>
             </a:r>
             <a:r>
-              <a:rPr lang="ru-RU" sz="2000">
+              <a:rPr lang="ru-RU" sz="2000" dirty="0">
                 <a:ea typeface="+mn-lt"/>
                 <a:cs typeface="+mn-lt"/>
               </a:rPr>
@@ -5107,34 +5738,41 @@
               </a:lnSpc>
             </a:pPr>
             <a:br>
-              <a:rPr lang="ru-RU">
+              <a:rPr lang="ru-RU" sz="2000" dirty="0">
                 <a:ea typeface="+mn-lt"/>
                 <a:cs typeface="+mn-lt"/>
               </a:rPr>
             </a:br>
             <a:r>
-              <a:rPr lang="ru-RU" sz="2800" b="1" err="1">
+              <a:rPr lang="ru-RU" b="1" err="1">
                 <a:ea typeface="+mn-lt"/>
                 <a:cs typeface="+mn-lt"/>
               </a:rPr>
               <a:t>Views</a:t>
             </a:r>
             <a:r>
-              <a:rPr lang="ru-RU" sz="2800" b="1">
+              <a:rPr lang="ru-RU" b="1" dirty="0">
                 <a:ea typeface="+mn-lt"/>
                 <a:cs typeface="+mn-lt"/>
               </a:rPr>
               <a:t> - </a:t>
             </a:r>
             <a:r>
-              <a:rPr lang="ru-RU" sz="2800">
-                <a:ea typeface="+mn-lt"/>
-                <a:cs typeface="+mn-lt"/>
-              </a:rPr>
-              <a:t>представления, которые альтернативно представляют данные, хранящиеся в других объектах.                                                                                   </a:t>
-            </a:r>
-            <a:r>
-              <a:rPr lang="ru-RU" sz="2000">
+              <a:rPr lang="ru-RU" dirty="0">
+                <a:ea typeface="+mn-lt"/>
+                <a:cs typeface="+mn-lt"/>
+              </a:rPr>
+              <a:t>представления, которые альтернативно представляют данные, хранящиеся в других объектах.</a:t>
+            </a:r>
+          </a:p>
+          <a:p>
+            <a:pPr algn="l">
+              <a:lnSpc>
+                <a:spcPct val="100000"/>
+              </a:lnSpc>
+            </a:pPr>
+            <a:r>
+              <a:rPr lang="ru-RU" sz="2000" dirty="0">
                 <a:ea typeface="+mn-lt"/>
                 <a:cs typeface="+mn-lt"/>
               </a:rPr>
@@ -5148,7 +5786,7 @@
               <a:t>view</a:t>
             </a:r>
             <a:r>
-              <a:rPr lang="ru-RU" sz="2000">
+              <a:rPr lang="ru-RU" sz="2000" dirty="0">
                 <a:ea typeface="+mn-lt"/>
                 <a:cs typeface="+mn-lt"/>
               </a:rPr>
@@ -5162,7 +5800,7 @@
               <a:t>texture</a:t>
             </a:r>
             <a:r>
-              <a:rPr lang="ru-RU" sz="2000">
+              <a:rPr lang="ru-RU" sz="2000" dirty="0">
                 <a:ea typeface="+mn-lt"/>
                 <a:cs typeface="+mn-lt"/>
               </a:rPr>
@@ -5176,7 +5814,7 @@
               <a:t>buffer</a:t>
             </a:r>
             <a:r>
-              <a:rPr lang="ru-RU" sz="2000">
+              <a:rPr lang="ru-RU" sz="2000" dirty="0">
                 <a:ea typeface="+mn-lt"/>
                 <a:cs typeface="+mn-lt"/>
               </a:rPr>
@@ -5190,23 +5828,20 @@
               <a:t>objects</a:t>
             </a:r>
             <a:r>
-              <a:rPr lang="ru-RU" sz="2000">
+              <a:rPr lang="ru-RU" sz="2000" dirty="0">
                 <a:ea typeface="+mn-lt"/>
                 <a:cs typeface="+mn-lt"/>
               </a:rPr>
               <a:t> представляет данные в буфере вершин (</a:t>
             </a:r>
             <a:r>
-              <a:rPr lang="ru-RU" sz="2000" i="1">
+              <a:rPr lang="ru-RU" sz="2000" i="1" dirty="0">
                 <a:ea typeface="+mn-lt"/>
                 <a:cs typeface="+mn-lt"/>
               </a:rPr>
               <a:t>VBO) )</a:t>
             </a:r>
-            <a:endParaRPr lang="ru-RU" sz="2800" i="1">
-              <a:ea typeface="+mn-lt"/>
-              <a:cs typeface="+mn-lt"/>
-            </a:endParaRPr>
+            <a:endParaRPr lang="ru-RU" sz="2000" dirty="0"/>
           </a:p>
           <a:p>
             <a:pPr algn="l">
@@ -5215,47 +5850,47 @@
               </a:lnSpc>
             </a:pPr>
             <a:br>
-              <a:rPr lang="ru-RU">
+              <a:rPr lang="ru-RU" sz="2000" dirty="0">
                 <a:ea typeface="+mn-lt"/>
                 <a:cs typeface="+mn-lt"/>
               </a:rPr>
             </a:br>
             <a:r>
-              <a:rPr lang="ru-RU" sz="2800">
+              <a:rPr lang="ru-RU" dirty="0">
                 <a:ea typeface="+mn-lt"/>
                 <a:cs typeface="+mn-lt"/>
               </a:rPr>
               <a:t>Каждый </a:t>
             </a:r>
             <a:r>
-              <a:rPr lang="ru-RU" sz="2800" b="1">
+              <a:rPr lang="ru-RU" b="1" dirty="0">
                 <a:ea typeface="+mn-lt"/>
                 <a:cs typeface="+mn-lt"/>
               </a:rPr>
               <a:t>контекст </a:t>
             </a:r>
             <a:r>
-              <a:rPr lang="ru-RU" sz="2800">
+              <a:rPr lang="ru-RU" dirty="0">
                 <a:ea typeface="+mn-lt"/>
                 <a:cs typeface="+mn-lt"/>
               </a:rPr>
               <a:t>должен иметь свой собственный </a:t>
             </a:r>
             <a:r>
-              <a:rPr lang="ru-RU" sz="2800" i="1">
+              <a:rPr lang="ru-RU" i="1" dirty="0">
                 <a:ea typeface="+mn-lt"/>
                 <a:cs typeface="+mn-lt"/>
               </a:rPr>
               <a:t>объект-контейнер</a:t>
             </a:r>
             <a:r>
-              <a:rPr lang="ru-RU" sz="2800">
+              <a:rPr lang="ru-RU" dirty="0">
                 <a:ea typeface="+mn-lt"/>
                 <a:cs typeface="+mn-lt"/>
               </a:rPr>
               <a:t>, а данные в них могут быть разделяемыми. </a:t>
             </a:r>
-            <a:endParaRPr lang="ru-RU" sz="2800" i="1">
+            <a:endParaRPr lang="ru-RU" i="1" dirty="0">
               <a:ea typeface="+mn-lt"/>
               <a:cs typeface="+mn-lt"/>
             </a:endParaRPr>
@@ -5267,21 +5902,21 @@
               </a:lnSpc>
             </a:pPr>
             <a:r>
-              <a:rPr lang="ru-RU" sz="2000">
+              <a:rPr lang="ru-RU" sz="2000" dirty="0">
                 <a:ea typeface="+mn-lt"/>
                 <a:cs typeface="+mn-lt"/>
               </a:rPr>
               <a:t>(</a:t>
             </a:r>
             <a:r>
-              <a:rPr lang="ru-RU" sz="2000" i="1">
+              <a:rPr lang="ru-RU" sz="2000" i="1" dirty="0">
                 <a:ea typeface="+mn-lt"/>
                 <a:cs typeface="+mn-lt"/>
               </a:rPr>
               <a:t>объекты-контейнеры</a:t>
             </a:r>
             <a:r>
-              <a:rPr lang="ru-RU" sz="2000">
+              <a:rPr lang="ru-RU" sz="2000" dirty="0">
                 <a:ea typeface="+mn-lt"/>
                 <a:cs typeface="+mn-lt"/>
               </a:rPr>
@@ -5295,7 +5930,7 @@
               <a:t>framebuffer</a:t>
             </a:r>
             <a:r>
-              <a:rPr lang="ru-RU" sz="2000">
+              <a:rPr lang="ru-RU" sz="2000" dirty="0">
                 <a:ea typeface="+mn-lt"/>
                 <a:cs typeface="+mn-lt"/>
               </a:rPr>
@@ -5309,7 +5944,7 @@
               <a:t>program</a:t>
             </a:r>
             <a:r>
-              <a:rPr lang="ru-RU" sz="2000">
+              <a:rPr lang="ru-RU" sz="2000" dirty="0">
                 <a:ea typeface="+mn-lt"/>
                 <a:cs typeface="+mn-lt"/>
               </a:rPr>
@@ -5323,7 +5958,7 @@
               <a:t>pipeline</a:t>
             </a:r>
             <a:r>
-              <a:rPr lang="ru-RU" sz="2000">
+              <a:rPr lang="ru-RU" sz="2000" dirty="0">
                 <a:ea typeface="+mn-lt"/>
                 <a:cs typeface="+mn-lt"/>
               </a:rPr>
@@ -5337,7 +5972,7 @@
               <a:t>transform</a:t>
             </a:r>
             <a:r>
-              <a:rPr lang="ru-RU" sz="2000">
+              <a:rPr lang="ru-RU" sz="2000" dirty="0">
                 <a:ea typeface="+mn-lt"/>
                 <a:cs typeface="+mn-lt"/>
               </a:rPr>
@@ -5351,7 +5986,7 @@
               <a:t>feedback</a:t>
             </a:r>
             <a:r>
-              <a:rPr lang="ru-RU" sz="2000">
+              <a:rPr lang="ru-RU" sz="2000" dirty="0">
                 <a:ea typeface="+mn-lt"/>
                 <a:cs typeface="+mn-lt"/>
               </a:rPr>
@@ -5365,7 +6000,7 @@
               <a:t>vertex</a:t>
             </a:r>
             <a:r>
-              <a:rPr lang="ru-RU" sz="2000">
+              <a:rPr lang="ru-RU" sz="2000" dirty="0">
                 <a:ea typeface="+mn-lt"/>
                 <a:cs typeface="+mn-lt"/>
               </a:rPr>
@@ -5379,7 +6014,7 @@
               <a:t>array</a:t>
             </a:r>
             <a:r>
-              <a:rPr lang="ru-RU" sz="2000">
+              <a:rPr lang="ru-RU" sz="2000" dirty="0">
                 <a:ea typeface="+mn-lt"/>
                 <a:cs typeface="+mn-lt"/>
               </a:rPr>
@@ -5393,7 +6028,7 @@
               <a:t>objects</a:t>
             </a:r>
             <a:r>
-              <a:rPr lang="ru-RU" sz="2000">
+              <a:rPr lang="ru-RU" sz="2000" dirty="0">
                 <a:ea typeface="+mn-lt"/>
                 <a:cs typeface="+mn-lt"/>
               </a:rPr>
@@ -5407,20 +6042,20 @@
               </a:lnSpc>
             </a:pPr>
             <a:r>
-              <a:rPr lang="ru-RU" sz="2800" b="1">
+              <a:rPr lang="ru-RU" b="1" dirty="0">
                 <a:ea typeface="+mn-lt"/>
                 <a:cs typeface="+mn-lt"/>
               </a:rPr>
               <a:t>Контекст </a:t>
             </a:r>
             <a:r>
-              <a:rPr lang="ru-RU" sz="2800">
-                <a:ea typeface="+mn-lt"/>
-                <a:cs typeface="+mn-lt"/>
-              </a:rPr>
-              <a:t>- этап обработки графических команд.</a:t>
-            </a:r>
-            <a:endParaRPr lang="ru-RU" sz="2800"/>
+              <a:rPr lang="ru-RU" dirty="0">
+                <a:ea typeface="+mn-lt"/>
+                <a:cs typeface="+mn-lt"/>
+              </a:rPr>
+              <a:t>- среда обработки графических команд.</a:t>
+            </a:r>
+            <a:endParaRPr lang="ru-RU" dirty="0"/>
           </a:p>
           <a:p>
             <a:pPr algn="l">
@@ -5428,7 +6063,7 @@
                 <a:spcPct val="100000"/>
               </a:lnSpc>
             </a:pPr>
-            <a:endParaRPr lang="ru-RU">
+            <a:endParaRPr lang="ru-RU" sz="2000" dirty="0">
               <a:ea typeface="+mn-lt"/>
               <a:cs typeface="+mn-lt"/>
             </a:endParaRPr>
@@ -5490,7 +6125,7 @@
         <p:spPr>
           <a:xfrm>
             <a:off x="1" y="-996"/>
-            <a:ext cx="12179160" cy="758980"/>
+            <a:ext cx="12171762" cy="648010"/>
           </a:xfrm>
         </p:spPr>
         <p:txBody>
@@ -5537,8 +6172,8 @@
         </p:nvSpPr>
         <p:spPr>
           <a:xfrm>
-            <a:off x="263406" y="756398"/>
-            <a:ext cx="11648912" cy="5954027"/>
+            <a:off x="204221" y="638029"/>
+            <a:ext cx="11456563" cy="657018"/>
           </a:xfrm>
         </p:spPr>
         <p:txBody>
@@ -5560,7 +6195,7 @@
               <a:t>Share</a:t>
             </a:r>
             <a:r>
-              <a:rPr lang="ru-RU" sz="2800" b="1">
+              <a:rPr lang="ru-RU" sz="2800" b="1" dirty="0">
                 <a:ea typeface="+mn-lt"/>
                 <a:cs typeface="+mn-lt"/>
               </a:rPr>
@@ -5574,13 +6209,13 @@
               <a:t>list</a:t>
             </a:r>
             <a:r>
-              <a:rPr lang="ru-RU" sz="2800">
+              <a:rPr lang="ru-RU" sz="2800" dirty="0">
                 <a:ea typeface="+mn-lt"/>
                 <a:cs typeface="+mn-lt"/>
               </a:rPr>
               <a:t> - группа контекстов, совместно использующие объект.</a:t>
             </a:r>
-            <a:endParaRPr lang="ru-RU"/>
+            <a:endParaRPr lang="ru-RU" sz="2800" dirty="0"/>
           </a:p>
           <a:p>
             <a:pPr algn="l">
@@ -5588,90 +6223,10 @@
                 <a:spcPct val="100000"/>
               </a:lnSpc>
             </a:pPr>
-            <a:r>
-              <a:rPr lang="ru-RU" sz="2800">
-                <a:ea typeface="+mn-lt"/>
-                <a:cs typeface="+mn-lt"/>
-              </a:rPr>
-              <a:t>Если объект не удаляется явно, то удаление контекста не влияет на него. Если контекст последний в </a:t>
-            </a:r>
-            <a:r>
-              <a:rPr lang="ru-RU" sz="2800" b="1" err="1">
-                <a:ea typeface="+mn-lt"/>
-                <a:cs typeface="+mn-lt"/>
-              </a:rPr>
-              <a:t>share</a:t>
-            </a:r>
-            <a:r>
-              <a:rPr lang="ru-RU" sz="2800" b="1">
-                <a:ea typeface="+mn-lt"/>
-                <a:cs typeface="+mn-lt"/>
-              </a:rPr>
-              <a:t> </a:t>
-            </a:r>
-            <a:r>
-              <a:rPr lang="ru-RU" sz="2800" b="1" err="1">
-                <a:ea typeface="+mn-lt"/>
-                <a:cs typeface="+mn-lt"/>
-              </a:rPr>
-              <a:t>list</a:t>
-            </a:r>
-            <a:r>
-              <a:rPr lang="ru-RU" sz="2800">
-                <a:ea typeface="+mn-lt"/>
-                <a:cs typeface="+mn-lt"/>
-              </a:rPr>
-              <a:t>, то</a:t>
-            </a:r>
-            <a:r>
-              <a:rPr lang="ru-RU" sz="2800" b="1">
-                <a:ea typeface="+mn-lt"/>
-                <a:cs typeface="+mn-lt"/>
-              </a:rPr>
-              <a:t> </a:t>
-            </a:r>
-            <a:r>
-              <a:rPr lang="ru-RU" sz="2800">
-                <a:ea typeface="+mn-lt"/>
-                <a:cs typeface="+mn-lt"/>
-              </a:rPr>
-              <a:t>при его удалении удаляется объект, а также все объекты, которые использовал этот контекст.</a:t>
-            </a:r>
-            <a:br>
-              <a:rPr lang="ru-RU" sz="2800" b="1">
-                <a:ea typeface="+mn-lt"/>
-                <a:cs typeface="+mn-lt"/>
-              </a:rPr>
-            </a:br>
-            <a:r>
-              <a:rPr lang="ru-RU" sz="2800"/>
-              <a:t>Когда объекты  удаляются, они автоматически отвязываются от всех точек связывания (</a:t>
-            </a:r>
-            <a:r>
-              <a:rPr lang="ru-RU" sz="2800" i="1" err="1"/>
-              <a:t>bind</a:t>
-            </a:r>
-            <a:r>
-              <a:rPr lang="ru-RU" sz="2800" i="1"/>
-              <a:t> </a:t>
-            </a:r>
-            <a:r>
-              <a:rPr lang="ru-RU" sz="2800" i="1" err="1"/>
-              <a:t>points</a:t>
-            </a:r>
-            <a:r>
-              <a:rPr lang="ru-RU" sz="2800"/>
-              <a:t>) и от объектов-контейнеров в </a:t>
-            </a:r>
-            <a:r>
-              <a:rPr lang="ru-RU" sz="2800" u="sng"/>
-              <a:t>текущем</a:t>
-            </a:r>
-            <a:r>
-              <a:rPr lang="ru-RU" sz="2800"/>
-              <a:t> контексте. После отвязывания объект не используется при отрисовке (рендеринге).</a:t>
-            </a:r>
-            <a:endParaRPr lang="ru-RU"/>
+            <a:endParaRPr lang="ru-RU" sz="2800" dirty="0">
+              <a:ea typeface="+mn-lt"/>
+              <a:cs typeface="+mn-lt"/>
+            </a:endParaRPr>
           </a:p>
           <a:p>
             <a:pPr algn="l">
@@ -5679,21 +6234,973 @@
                 <a:spcPct val="100000"/>
               </a:lnSpc>
             </a:pPr>
+            <a:endParaRPr lang="ru-RU" sz="2800" dirty="0">
+              <a:ea typeface="+mn-lt"/>
+              <a:cs typeface="+mn-lt"/>
+            </a:endParaRPr>
+          </a:p>
+          <a:p>
+            <a:pPr algn="l">
+              <a:lnSpc>
+                <a:spcPct val="100000"/>
+              </a:lnSpc>
+            </a:pPr>
+            <a:endParaRPr lang="ru-RU" sz="2800" dirty="0">
+              <a:ea typeface="+mn-lt"/>
+              <a:cs typeface="+mn-lt"/>
+            </a:endParaRPr>
+          </a:p>
+          <a:p>
+            <a:pPr algn="l">
+              <a:lnSpc>
+                <a:spcPct val="100000"/>
+              </a:lnSpc>
+            </a:pPr>
+            <a:endParaRPr lang="ru-RU" sz="2800" dirty="0">
+              <a:ea typeface="+mn-lt"/>
+              <a:cs typeface="+mn-lt"/>
+            </a:endParaRPr>
+          </a:p>
+          <a:p>
+            <a:pPr algn="l">
+              <a:lnSpc>
+                <a:spcPct val="100000"/>
+              </a:lnSpc>
+            </a:pPr>
+            <a:endParaRPr lang="ru-RU" sz="2800" dirty="0">
+              <a:ea typeface="+mn-lt"/>
+              <a:cs typeface="+mn-lt"/>
+            </a:endParaRPr>
+          </a:p>
+          <a:p>
+            <a:pPr algn="l">
+              <a:lnSpc>
+                <a:spcPct val="100000"/>
+              </a:lnSpc>
+            </a:pPr>
+            <a:endParaRPr lang="ru-RU" sz="2800" dirty="0">
+              <a:ea typeface="+mn-lt"/>
+              <a:cs typeface="+mn-lt"/>
+            </a:endParaRPr>
+          </a:p>
+          <a:p>
+            <a:pPr algn="l">
+              <a:lnSpc>
+                <a:spcPct val="100000"/>
+              </a:lnSpc>
+            </a:pPr>
+            <a:endParaRPr lang="ru-RU" sz="2800" dirty="0">
+              <a:ea typeface="+mn-lt"/>
+              <a:cs typeface="+mn-lt"/>
+            </a:endParaRPr>
+          </a:p>
+          <a:p>
+            <a:pPr algn="l">
+              <a:lnSpc>
+                <a:spcPct val="100000"/>
+              </a:lnSpc>
+            </a:pPr>
+            <a:endParaRPr lang="ru-RU" sz="2800"/>
+          </a:p>
+        </p:txBody>
+      </p:sp>
+      <p:sp>
+        <p:nvSpPr>
+          <p:cNvPr id="6" name="Прямоугольник: скругленные углы 5">
+            <a:extLst>
+              <a:ext uri="{FF2B5EF4-FFF2-40B4-BE49-F238E27FC236}">
+                <a16:creationId xmlns:a16="http://schemas.microsoft.com/office/drawing/2014/main" id="{F23A8FCF-4217-60E2-83BF-0C87E14B71E7}"/>
+              </a:ext>
+            </a:extLst>
+          </p:cNvPr>
+          <p:cNvSpPr/>
+          <p:nvPr/>
+        </p:nvSpPr>
+        <p:spPr>
+          <a:xfrm>
+            <a:off x="1531184" y="1302298"/>
+            <a:ext cx="3035059" cy="913650"/>
+          </a:xfrm>
+          <a:prstGeom prst="roundRect">
+            <a:avLst/>
+          </a:prstGeom>
+          <a:solidFill>
+            <a:schemeClr val="accent4">
+              <a:lumMod val="40000"/>
+              <a:lumOff val="60000"/>
+            </a:schemeClr>
+          </a:solidFill>
+        </p:spPr>
+        <p:style>
+          <a:lnRef idx="2">
+            <a:schemeClr val="accent1">
+              <a:shade val="15000"/>
+            </a:schemeClr>
+          </a:lnRef>
+          <a:fillRef idx="1">
+            <a:schemeClr val="accent1"/>
+          </a:fillRef>
+          <a:effectRef idx="0">
+            <a:schemeClr val="accent1"/>
+          </a:effectRef>
+          <a:fontRef idx="minor">
+            <a:schemeClr val="lt1"/>
+          </a:fontRef>
+        </p:style>
+        <p:txBody>
+          <a:bodyPr rtlCol="0" anchor="ctr"/>
+          <a:lstStyle/>
+          <a:p>
+            <a:pPr algn="ctr"/>
+            <a:r>
+              <a:rPr lang="ru-RU" sz="2800" b="1" dirty="0">
+                <a:solidFill>
+                  <a:schemeClr val="tx1"/>
+                </a:solidFill>
+              </a:rPr>
+              <a:t>Объект OpenGL</a:t>
+            </a:r>
+          </a:p>
+        </p:txBody>
+      </p:sp>
+      <p:sp>
+        <p:nvSpPr>
+          <p:cNvPr id="8" name="Прямоугольник: скругленные углы 7">
+            <a:extLst>
+              <a:ext uri="{FF2B5EF4-FFF2-40B4-BE49-F238E27FC236}">
+                <a16:creationId xmlns:a16="http://schemas.microsoft.com/office/drawing/2014/main" id="{6E6DEDB6-0AEC-430D-2395-192C222FFDB5}"/>
+              </a:ext>
+            </a:extLst>
+          </p:cNvPr>
+          <p:cNvSpPr/>
+          <p:nvPr/>
+        </p:nvSpPr>
+        <p:spPr>
+          <a:xfrm>
+            <a:off x="196562" y="3079616"/>
+            <a:ext cx="5624512" cy="1781402"/>
+          </a:xfrm>
+          <a:prstGeom prst="roundRect">
+            <a:avLst/>
+          </a:prstGeom>
+          <a:solidFill>
+            <a:schemeClr val="bg2"/>
+          </a:solidFill>
+        </p:spPr>
+        <p:style>
+          <a:lnRef idx="2">
+            <a:schemeClr val="accent1">
+              <a:shade val="15000"/>
+            </a:schemeClr>
+          </a:lnRef>
+          <a:fillRef idx="1">
+            <a:schemeClr val="accent1"/>
+          </a:fillRef>
+          <a:effectRef idx="0">
+            <a:schemeClr val="accent1"/>
+          </a:effectRef>
+          <a:fontRef idx="minor">
+            <a:schemeClr val="lt1"/>
+          </a:fontRef>
+        </p:style>
+        <p:txBody>
+          <a:bodyPr lIns="91440" tIns="45720" rIns="91440" bIns="45720" rtlCol="0" anchor="ctr"/>
+          <a:lstStyle/>
+          <a:p>
+            <a:pPr algn="ctr"/>
+            <a:endParaRPr lang="ru-RU" sz="2800" b="1" dirty="0">
+              <a:solidFill>
+                <a:schemeClr val="tx1"/>
+              </a:solidFill>
+            </a:endParaRPr>
+          </a:p>
+        </p:txBody>
+      </p:sp>
+      <p:sp>
+        <p:nvSpPr>
+          <p:cNvPr id="9" name="TextBox 8">
+            <a:extLst>
+              <a:ext uri="{FF2B5EF4-FFF2-40B4-BE49-F238E27FC236}">
+                <a16:creationId xmlns:a16="http://schemas.microsoft.com/office/drawing/2014/main" id="{AC9C64B5-F5A2-9C66-D8C9-6693CEC930FB}"/>
+              </a:ext>
+            </a:extLst>
+          </p:cNvPr>
+          <p:cNvSpPr txBox="1"/>
+          <p:nvPr/>
+        </p:nvSpPr>
+        <p:spPr>
+          <a:xfrm>
+            <a:off x="199628" y="4347025"/>
+            <a:ext cx="1789561" cy="523220"/>
+          </a:xfrm>
+          <a:prstGeom prst="rect">
+            <a:avLst/>
+          </a:prstGeom>
+          <a:noFill/>
+        </p:spPr>
+        <p:txBody>
+          <a:bodyPr rot="0" spcFirstLastPara="0" vertOverflow="overflow" horzOverflow="overflow" vert="horz" wrap="square" lIns="91440" tIns="45720" rIns="91440" bIns="45720" numCol="1" spcCol="0" rtlCol="0" fromWordArt="0" anchor="t" anchorCtr="0" forceAA="0" compatLnSpc="1">
+            <a:prstTxWarp prst="textNoShape">
+              <a:avLst/>
+            </a:prstTxWarp>
+            <a:spAutoFit/>
+          </a:bodyPr>
+          <a:lstStyle/>
+          <a:p>
+            <a:pPr algn="ctr"/>
+            <a:r>
+              <a:rPr lang="ru-RU" sz="2800" b="1" err="1"/>
+              <a:t>Share</a:t>
+            </a:r>
+            <a:r>
+              <a:rPr lang="ru-RU" sz="2800" b="1" dirty="0"/>
+              <a:t> </a:t>
+            </a:r>
+            <a:r>
+              <a:rPr lang="ru-RU" sz="2800" b="1" err="1"/>
+              <a:t>list</a:t>
+            </a:r>
+            <a:endParaRPr lang="ru-RU" sz="2800" b="1" dirty="0"/>
+          </a:p>
+        </p:txBody>
+      </p:sp>
+      <p:sp>
+        <p:nvSpPr>
+          <p:cNvPr id="10" name="Прямоугольник: скругленные углы 9">
+            <a:extLst>
+              <a:ext uri="{FF2B5EF4-FFF2-40B4-BE49-F238E27FC236}">
+                <a16:creationId xmlns:a16="http://schemas.microsoft.com/office/drawing/2014/main" id="{E024D997-0E0A-D522-F6A8-912A5E87778A}"/>
+              </a:ext>
+            </a:extLst>
+          </p:cNvPr>
+          <p:cNvSpPr/>
+          <p:nvPr/>
+        </p:nvSpPr>
+        <p:spPr>
+          <a:xfrm>
+            <a:off x="449481" y="3725955"/>
+            <a:ext cx="2028130" cy="514155"/>
+          </a:xfrm>
+          <a:prstGeom prst="roundRect">
+            <a:avLst/>
+          </a:prstGeom>
+          <a:solidFill>
+            <a:schemeClr val="accent2">
+              <a:lumMod val="40000"/>
+              <a:lumOff val="60000"/>
+            </a:schemeClr>
+          </a:solidFill>
+        </p:spPr>
+        <p:style>
+          <a:lnRef idx="2">
+            <a:schemeClr val="accent1">
+              <a:shade val="15000"/>
+            </a:schemeClr>
+          </a:lnRef>
+          <a:fillRef idx="1">
+            <a:schemeClr val="accent1"/>
+          </a:fillRef>
+          <a:effectRef idx="0">
+            <a:schemeClr val="accent1"/>
+          </a:effectRef>
+          <a:fontRef idx="minor">
+            <a:schemeClr val="lt1"/>
+          </a:fontRef>
+        </p:style>
+        <p:txBody>
+          <a:bodyPr lIns="91440" tIns="45720" rIns="91440" bIns="45720" rtlCol="0" anchor="ctr"/>
+          <a:lstStyle/>
+          <a:p>
+            <a:pPr algn="ctr"/>
+            <a:r>
+              <a:rPr lang="ru-RU" sz="2800" b="1" dirty="0">
+                <a:solidFill>
+                  <a:schemeClr val="tx1"/>
+                </a:solidFill>
+              </a:rPr>
+              <a:t>Контекст1</a:t>
+            </a:r>
+          </a:p>
+        </p:txBody>
+      </p:sp>
+      <p:sp>
+        <p:nvSpPr>
+          <p:cNvPr id="11" name="Прямоугольник: скругленные углы 10">
+            <a:extLst>
+              <a:ext uri="{FF2B5EF4-FFF2-40B4-BE49-F238E27FC236}">
+                <a16:creationId xmlns:a16="http://schemas.microsoft.com/office/drawing/2014/main" id="{AEA03E43-FC7F-1E08-4BE4-4A53CAE48422}"/>
+              </a:ext>
+            </a:extLst>
+          </p:cNvPr>
+          <p:cNvSpPr/>
+          <p:nvPr/>
+        </p:nvSpPr>
+        <p:spPr>
+          <a:xfrm>
+            <a:off x="3218469" y="3748148"/>
+            <a:ext cx="2028130" cy="514155"/>
+          </a:xfrm>
+          <a:prstGeom prst="roundRect">
+            <a:avLst/>
+          </a:prstGeom>
+          <a:solidFill>
+            <a:schemeClr val="accent2">
+              <a:lumMod val="40000"/>
+              <a:lumOff val="60000"/>
+            </a:schemeClr>
+          </a:solidFill>
+        </p:spPr>
+        <p:style>
+          <a:lnRef idx="2">
+            <a:schemeClr val="accent1">
+              <a:shade val="15000"/>
+            </a:schemeClr>
+          </a:lnRef>
+          <a:fillRef idx="1">
+            <a:schemeClr val="accent1"/>
+          </a:fillRef>
+          <a:effectRef idx="0">
+            <a:schemeClr val="accent1"/>
+          </a:effectRef>
+          <a:fontRef idx="minor">
+            <a:schemeClr val="lt1"/>
+          </a:fontRef>
+        </p:style>
+        <p:txBody>
+          <a:bodyPr lIns="91440" tIns="45720" rIns="91440" bIns="45720" rtlCol="0" anchor="ctr"/>
+          <a:lstStyle/>
+          <a:p>
+            <a:pPr algn="ctr"/>
+            <a:r>
+              <a:rPr lang="ru-RU" sz="2800" b="1" dirty="0">
+                <a:solidFill>
+                  <a:schemeClr val="tx1"/>
+                </a:solidFill>
+              </a:rPr>
+              <a:t>Контекст2</a:t>
+            </a:r>
+          </a:p>
+        </p:txBody>
+      </p:sp>
+      <p:sp>
+        <p:nvSpPr>
+          <p:cNvPr id="34" name="Прямоугольник: скругленные углы 33">
+            <a:extLst>
+              <a:ext uri="{FF2B5EF4-FFF2-40B4-BE49-F238E27FC236}">
+                <a16:creationId xmlns:a16="http://schemas.microsoft.com/office/drawing/2014/main" id="{81F8C4F9-9F25-235D-BBFC-288A1B6254D1}"/>
+              </a:ext>
+            </a:extLst>
+          </p:cNvPr>
+          <p:cNvSpPr/>
+          <p:nvPr/>
+        </p:nvSpPr>
+        <p:spPr>
+          <a:xfrm>
+            <a:off x="7449036" y="1304081"/>
+            <a:ext cx="3412359" cy="921048"/>
+          </a:xfrm>
+          <a:prstGeom prst="roundRect">
+            <a:avLst/>
+          </a:prstGeom>
+          <a:solidFill>
+            <a:schemeClr val="accent4">
+              <a:lumMod val="40000"/>
+              <a:lumOff val="60000"/>
+            </a:schemeClr>
+          </a:solidFill>
+        </p:spPr>
+        <p:style>
+          <a:lnRef idx="2">
+            <a:schemeClr val="accent1">
+              <a:shade val="15000"/>
+            </a:schemeClr>
+          </a:lnRef>
+          <a:fillRef idx="1">
+            <a:schemeClr val="accent1"/>
+          </a:fillRef>
+          <a:effectRef idx="0">
+            <a:schemeClr val="accent1"/>
+          </a:effectRef>
+          <a:fontRef idx="minor">
+            <a:schemeClr val="lt1"/>
+          </a:fontRef>
+        </p:style>
+        <p:txBody>
+          <a:bodyPr lIns="91440" tIns="45720" rIns="91440" bIns="45720" rtlCol="0" anchor="ctr"/>
+          <a:lstStyle/>
+          <a:p>
+            <a:pPr algn="ctr"/>
+            <a:r>
+              <a:rPr lang="ru-RU" sz="2800" b="1" dirty="0">
+                <a:solidFill>
+                  <a:schemeClr val="tx1"/>
+                </a:solidFill>
+              </a:rPr>
+              <a:t>Объект     OpenGL</a:t>
+            </a:r>
+          </a:p>
+        </p:txBody>
+      </p:sp>
+      <p:sp>
+        <p:nvSpPr>
+          <p:cNvPr id="35" name="Прямоугольник: скругленные углы 34">
+            <a:extLst>
+              <a:ext uri="{FF2B5EF4-FFF2-40B4-BE49-F238E27FC236}">
+                <a16:creationId xmlns:a16="http://schemas.microsoft.com/office/drawing/2014/main" id="{3182F7D2-2F43-65FB-8449-AFA86758ACE0}"/>
+              </a:ext>
+            </a:extLst>
+          </p:cNvPr>
+          <p:cNvSpPr/>
+          <p:nvPr/>
+        </p:nvSpPr>
+        <p:spPr>
+          <a:xfrm>
+            <a:off x="6114415" y="3074596"/>
+            <a:ext cx="5793082" cy="1787016"/>
+          </a:xfrm>
+          <a:prstGeom prst="roundRect">
+            <a:avLst/>
+          </a:prstGeom>
+          <a:solidFill>
+            <a:schemeClr val="bg2"/>
+          </a:solidFill>
+        </p:spPr>
+        <p:style>
+          <a:lnRef idx="2">
+            <a:schemeClr val="accent1">
+              <a:shade val="15000"/>
+            </a:schemeClr>
+          </a:lnRef>
+          <a:fillRef idx="1">
+            <a:schemeClr val="accent1"/>
+          </a:fillRef>
+          <a:effectRef idx="0">
+            <a:schemeClr val="accent1"/>
+          </a:effectRef>
+          <a:fontRef idx="minor">
+            <a:schemeClr val="lt1"/>
+          </a:fontRef>
+        </p:style>
+        <p:txBody>
+          <a:bodyPr lIns="91440" tIns="45720" rIns="91440" bIns="45720" rtlCol="0" anchor="ctr"/>
+          <a:lstStyle/>
+          <a:p>
+            <a:pPr algn="ctr"/>
+            <a:endParaRPr lang="ru-RU" sz="2800" b="1" dirty="0">
+              <a:solidFill>
+                <a:schemeClr val="tx1"/>
+              </a:solidFill>
+            </a:endParaRPr>
+          </a:p>
+        </p:txBody>
+      </p:sp>
+      <p:sp>
+        <p:nvSpPr>
+          <p:cNvPr id="36" name="TextBox 35">
+            <a:extLst>
+              <a:ext uri="{FF2B5EF4-FFF2-40B4-BE49-F238E27FC236}">
+                <a16:creationId xmlns:a16="http://schemas.microsoft.com/office/drawing/2014/main" id="{AF8C2A9F-066F-B4AC-B4F0-7C8A7A652E54}"/>
+              </a:ext>
+            </a:extLst>
+          </p:cNvPr>
+          <p:cNvSpPr txBox="1"/>
+          <p:nvPr/>
+        </p:nvSpPr>
+        <p:spPr>
+          <a:xfrm>
+            <a:off x="10049283" y="4341741"/>
+            <a:ext cx="1789561" cy="523220"/>
+          </a:xfrm>
+          <a:prstGeom prst="rect">
+            <a:avLst/>
+          </a:prstGeom>
+          <a:noFill/>
+        </p:spPr>
+        <p:txBody>
+          <a:bodyPr rot="0" spcFirstLastPara="0" vertOverflow="overflow" horzOverflow="overflow" vert="horz" wrap="square" lIns="91440" tIns="45720" rIns="91440" bIns="45720" numCol="1" spcCol="0" rtlCol="0" fromWordArt="0" anchor="t" anchorCtr="0" forceAA="0" compatLnSpc="1">
+            <a:prstTxWarp prst="textNoShape">
+              <a:avLst/>
+            </a:prstTxWarp>
+            <a:spAutoFit/>
+          </a:bodyPr>
+          <a:lstStyle/>
+          <a:p>
+            <a:pPr algn="ctr"/>
+            <a:r>
+              <a:rPr lang="ru-RU" sz="2800" b="1" err="1"/>
+              <a:t>Share</a:t>
+            </a:r>
+            <a:r>
+              <a:rPr lang="ru-RU" sz="2800" b="1" dirty="0"/>
+              <a:t> </a:t>
+            </a:r>
+            <a:r>
+              <a:rPr lang="ru-RU" sz="2800" b="1" err="1"/>
+              <a:t>list</a:t>
+            </a:r>
+            <a:endParaRPr lang="ru-RU" sz="2800" b="1" dirty="0"/>
+          </a:p>
+        </p:txBody>
+      </p:sp>
+      <p:sp>
+        <p:nvSpPr>
+          <p:cNvPr id="37" name="Прямоугольник: скругленные углы 36">
+            <a:extLst>
+              <a:ext uri="{FF2B5EF4-FFF2-40B4-BE49-F238E27FC236}">
+                <a16:creationId xmlns:a16="http://schemas.microsoft.com/office/drawing/2014/main" id="{729210E6-0C9B-4CD7-DD6D-7F957841ECD0}"/>
+              </a:ext>
+            </a:extLst>
+          </p:cNvPr>
+          <p:cNvSpPr/>
+          <p:nvPr/>
+        </p:nvSpPr>
+        <p:spPr>
+          <a:xfrm>
+            <a:off x="6797148" y="3727737"/>
+            <a:ext cx="2028130" cy="514155"/>
+          </a:xfrm>
+          <a:prstGeom prst="roundRect">
+            <a:avLst/>
+          </a:prstGeom>
+          <a:solidFill>
+            <a:schemeClr val="accent2">
+              <a:lumMod val="40000"/>
+              <a:lumOff val="60000"/>
+            </a:schemeClr>
+          </a:solidFill>
+        </p:spPr>
+        <p:style>
+          <a:lnRef idx="2">
+            <a:schemeClr val="accent1">
+              <a:shade val="15000"/>
+            </a:schemeClr>
+          </a:lnRef>
+          <a:fillRef idx="1">
+            <a:schemeClr val="accent1"/>
+          </a:fillRef>
+          <a:effectRef idx="0">
+            <a:schemeClr val="accent1"/>
+          </a:effectRef>
+          <a:fontRef idx="minor">
+            <a:schemeClr val="lt1"/>
+          </a:fontRef>
+        </p:style>
+        <p:txBody>
+          <a:bodyPr lIns="91440" tIns="45720" rIns="91440" bIns="45720" rtlCol="0" anchor="ctr"/>
+          <a:lstStyle/>
+          <a:p>
+            <a:pPr algn="ctr"/>
+            <a:r>
+              <a:rPr lang="ru-RU" sz="2800" b="1" dirty="0">
+                <a:solidFill>
+                  <a:schemeClr val="tx1"/>
+                </a:solidFill>
+              </a:rPr>
+              <a:t>Контекст</a:t>
+            </a:r>
+          </a:p>
+        </p:txBody>
+      </p:sp>
+      <p:sp>
+        <p:nvSpPr>
+          <p:cNvPr id="39" name="Стрелка: влево 38">
+            <a:extLst>
+              <a:ext uri="{FF2B5EF4-FFF2-40B4-BE49-F238E27FC236}">
+                <a16:creationId xmlns:a16="http://schemas.microsoft.com/office/drawing/2014/main" id="{B02F06D2-4989-7E6E-6AA4-087F15C78C6F}"/>
+              </a:ext>
+            </a:extLst>
+          </p:cNvPr>
+          <p:cNvSpPr/>
+          <p:nvPr/>
+        </p:nvSpPr>
+        <p:spPr>
+          <a:xfrm rot="17220000" flipH="1">
+            <a:off x="7631011" y="2821661"/>
+            <a:ext cx="1556281" cy="274751"/>
+          </a:xfrm>
+          <a:prstGeom prst="leftArrow">
+            <a:avLst/>
+          </a:prstGeom>
+        </p:spPr>
+        <p:style>
+          <a:lnRef idx="2">
+            <a:schemeClr val="accent1">
+              <a:shade val="15000"/>
+            </a:schemeClr>
+          </a:lnRef>
+          <a:fillRef idx="1">
+            <a:schemeClr val="accent1"/>
+          </a:fillRef>
+          <a:effectRef idx="0">
+            <a:schemeClr val="accent1"/>
+          </a:effectRef>
+          <a:fontRef idx="minor">
+            <a:schemeClr val="lt1"/>
+          </a:fontRef>
+        </p:style>
+        <p:txBody>
+          <a:bodyPr rtlCol="0" anchor="ctr"/>
+          <a:lstStyle/>
+          <a:p>
+            <a:pPr algn="ctr"/>
+            <a:endParaRPr lang="ru-RU"/>
+          </a:p>
+        </p:txBody>
+      </p:sp>
+      <p:sp>
+        <p:nvSpPr>
+          <p:cNvPr id="50" name="TextBox 49">
+            <a:extLst>
+              <a:ext uri="{FF2B5EF4-FFF2-40B4-BE49-F238E27FC236}">
+                <a16:creationId xmlns:a16="http://schemas.microsoft.com/office/drawing/2014/main" id="{F404C030-9A8A-6636-8E49-2244C2441FCC}"/>
+              </a:ext>
+            </a:extLst>
+          </p:cNvPr>
+          <p:cNvSpPr txBox="1"/>
+          <p:nvPr/>
+        </p:nvSpPr>
+        <p:spPr>
+          <a:xfrm>
+            <a:off x="199629" y="4952783"/>
+            <a:ext cx="11799133" cy="1767695"/>
+          </a:xfrm>
+          <a:prstGeom prst="rect">
+            <a:avLst/>
+          </a:prstGeom>
+          <a:noFill/>
+        </p:spPr>
+        <p:txBody>
+          <a:bodyPr rot="0" spcFirstLastPara="0" vertOverflow="overflow" horzOverflow="overflow" vert="horz" wrap="square" lIns="91440" tIns="45720" rIns="91440" bIns="45720" numCol="1" spcCol="0" rtlCol="0" fromWordArt="0" anchor="t" anchorCtr="0" forceAA="0" compatLnSpc="1">
+            <a:prstTxWarp prst="textNoShape">
+              <a:avLst/>
+            </a:prstTxWarp>
+            <a:noAutofit/>
+          </a:bodyPr>
+          <a:lstStyle/>
+          <a:p>
+            <a:r>
+              <a:rPr lang="ru-RU" sz="2800" dirty="0"/>
+              <a:t>Если объект не удаляется явно, то удаление контекста не влияет на него. Если контекст последний в </a:t>
+            </a:r>
+            <a:r>
+              <a:rPr lang="ru-RU" sz="2800" b="1" err="1"/>
+              <a:t>share</a:t>
+            </a:r>
+            <a:r>
+              <a:rPr lang="ru-RU" sz="2800" b="1" dirty="0"/>
+              <a:t> </a:t>
+            </a:r>
+            <a:r>
+              <a:rPr lang="ru-RU" sz="2800" b="1" err="1"/>
+              <a:t>list</a:t>
+            </a:r>
+            <a:r>
+              <a:rPr lang="ru-RU" sz="2800" dirty="0"/>
+              <a:t>, то</a:t>
+            </a:r>
+            <a:r>
+              <a:rPr lang="ru-RU" sz="2800" b="1" dirty="0"/>
+              <a:t> </a:t>
+            </a:r>
+            <a:r>
+              <a:rPr lang="ru-RU" sz="2800" dirty="0"/>
+              <a:t>при его удалении удаляется объект, а также все объекты, которые использовал этот контекст.</a:t>
+            </a:r>
             <a:br>
-              <a:rPr lang="ru-RU" sz="2800"/>
+              <a:rPr lang="ru-RU" sz="2800" dirty="0"/>
             </a:br>
-            <a:r>
-              <a:rPr lang="ru-RU" sz="2800"/>
-              <a:t>Если при привязке было установлено значение - оно будет выставлено на значение </a:t>
-            </a:r>
-            <a:r>
-              <a:rPr lang="ru-RU" sz="2800" i="1"/>
-              <a:t>по умолчанию</a:t>
-            </a:r>
-            <a:r>
-              <a:rPr lang="ru-RU" sz="2800"/>
-              <a:t>.</a:t>
-            </a:r>
+            <a:endParaRPr lang="ru-RU" sz="2800" dirty="0"/>
+          </a:p>
+          <a:p>
+            <a:endParaRPr lang="ru-RU" sz="2800" b="1" dirty="0"/>
+          </a:p>
+        </p:txBody>
+      </p:sp>
+      <p:sp>
+        <p:nvSpPr>
+          <p:cNvPr id="51" name="Знак умножения 50">
+            <a:extLst>
+              <a:ext uri="{FF2B5EF4-FFF2-40B4-BE49-F238E27FC236}">
+                <a16:creationId xmlns:a16="http://schemas.microsoft.com/office/drawing/2014/main" id="{ED262456-E56A-74DD-C984-46C6B42EB9D7}"/>
+              </a:ext>
+            </a:extLst>
+          </p:cNvPr>
+          <p:cNvSpPr/>
+          <p:nvPr/>
+        </p:nvSpPr>
+        <p:spPr>
+          <a:xfrm>
+            <a:off x="3872445" y="2792967"/>
+            <a:ext cx="855765" cy="2427767"/>
+          </a:xfrm>
+          <a:prstGeom prst="mathMultiply">
+            <a:avLst/>
+          </a:prstGeom>
+          <a:solidFill>
+            <a:srgbClr val="FF0000"/>
+          </a:solidFill>
+        </p:spPr>
+        <p:style>
+          <a:lnRef idx="2">
+            <a:schemeClr val="accent1">
+              <a:shade val="15000"/>
+            </a:schemeClr>
+          </a:lnRef>
+          <a:fillRef idx="1">
+            <a:schemeClr val="accent1"/>
+          </a:fillRef>
+          <a:effectRef idx="0">
+            <a:schemeClr val="accent1"/>
+          </a:effectRef>
+          <a:fontRef idx="minor">
+            <a:schemeClr val="lt1"/>
+          </a:fontRef>
+        </p:style>
+        <p:txBody>
+          <a:bodyPr rtlCol="0" anchor="ctr"/>
+          <a:lstStyle/>
+          <a:p>
+            <a:pPr algn="ctr"/>
+            <a:endParaRPr lang="ru-RU"/>
+          </a:p>
+        </p:txBody>
+      </p:sp>
+      <p:sp>
+        <p:nvSpPr>
+          <p:cNvPr id="52" name="Знак умножения 51">
+            <a:extLst>
+              <a:ext uri="{FF2B5EF4-FFF2-40B4-BE49-F238E27FC236}">
+                <a16:creationId xmlns:a16="http://schemas.microsoft.com/office/drawing/2014/main" id="{A3F0BAD8-77C0-B50F-197B-96B02886A988}"/>
+              </a:ext>
+            </a:extLst>
+          </p:cNvPr>
+          <p:cNvSpPr/>
+          <p:nvPr/>
+        </p:nvSpPr>
+        <p:spPr>
+          <a:xfrm>
+            <a:off x="7282950" y="2696792"/>
+            <a:ext cx="855765" cy="2427767"/>
+          </a:xfrm>
+          <a:prstGeom prst="mathMultiply">
+            <a:avLst/>
+          </a:prstGeom>
+          <a:solidFill>
+            <a:srgbClr val="FF0000"/>
+          </a:solidFill>
+        </p:spPr>
+        <p:style>
+          <a:lnRef idx="2">
+            <a:schemeClr val="accent1">
+              <a:shade val="15000"/>
+            </a:schemeClr>
+          </a:lnRef>
+          <a:fillRef idx="1">
+            <a:schemeClr val="accent1"/>
+          </a:fillRef>
+          <a:effectRef idx="0">
+            <a:schemeClr val="accent1"/>
+          </a:effectRef>
+          <a:fontRef idx="minor">
+            <a:schemeClr val="lt1"/>
+          </a:fontRef>
+        </p:style>
+        <p:txBody>
+          <a:bodyPr rtlCol="0" anchor="ctr"/>
+          <a:lstStyle/>
+          <a:p>
+            <a:pPr algn="ctr"/>
+            <a:endParaRPr lang="ru-RU"/>
+          </a:p>
+        </p:txBody>
+      </p:sp>
+      <p:sp>
+        <p:nvSpPr>
+          <p:cNvPr id="53" name="Знак умножения 52">
+            <a:extLst>
+              <a:ext uri="{FF2B5EF4-FFF2-40B4-BE49-F238E27FC236}">
+                <a16:creationId xmlns:a16="http://schemas.microsoft.com/office/drawing/2014/main" id="{39DCC8B3-030F-B0C1-3F06-4C41FC17F3A8}"/>
+              </a:ext>
+            </a:extLst>
+          </p:cNvPr>
+          <p:cNvSpPr/>
+          <p:nvPr/>
+        </p:nvSpPr>
+        <p:spPr>
+          <a:xfrm>
+            <a:off x="8725571" y="499569"/>
+            <a:ext cx="855765" cy="2427767"/>
+          </a:xfrm>
+          <a:prstGeom prst="mathMultiply">
+            <a:avLst/>
+          </a:prstGeom>
+          <a:solidFill>
+            <a:srgbClr val="FF0000"/>
+          </a:solidFill>
+        </p:spPr>
+        <p:style>
+          <a:lnRef idx="2">
+            <a:schemeClr val="accent1">
+              <a:shade val="15000"/>
+            </a:schemeClr>
+          </a:lnRef>
+          <a:fillRef idx="1">
+            <a:schemeClr val="accent1"/>
+          </a:fillRef>
+          <a:effectRef idx="0">
+            <a:schemeClr val="accent1"/>
+          </a:effectRef>
+          <a:fontRef idx="minor">
+            <a:schemeClr val="lt1"/>
+          </a:fontRef>
+        </p:style>
+        <p:txBody>
+          <a:bodyPr rtlCol="0" anchor="ctr"/>
+          <a:lstStyle/>
+          <a:p>
+            <a:pPr algn="ctr"/>
+            <a:endParaRPr lang="ru-RU"/>
+          </a:p>
+        </p:txBody>
+      </p:sp>
+      <p:sp>
+        <p:nvSpPr>
+          <p:cNvPr id="54" name="Стрелка: влево 53">
+            <a:extLst>
+              <a:ext uri="{FF2B5EF4-FFF2-40B4-BE49-F238E27FC236}">
+                <a16:creationId xmlns:a16="http://schemas.microsoft.com/office/drawing/2014/main" id="{20A16EEA-D1E2-1C46-F03D-7F703061FE8A}"/>
+              </a:ext>
+            </a:extLst>
+          </p:cNvPr>
+          <p:cNvSpPr/>
+          <p:nvPr/>
+        </p:nvSpPr>
+        <p:spPr>
+          <a:xfrm rot="17220000" flipH="1">
+            <a:off x="1113322" y="2829059"/>
+            <a:ext cx="1556281" cy="274751"/>
+          </a:xfrm>
+          <a:prstGeom prst="leftArrow">
+            <a:avLst/>
+          </a:prstGeom>
+        </p:spPr>
+        <p:style>
+          <a:lnRef idx="2">
+            <a:schemeClr val="accent1">
+              <a:shade val="15000"/>
+            </a:schemeClr>
+          </a:lnRef>
+          <a:fillRef idx="1">
+            <a:schemeClr val="accent1"/>
+          </a:fillRef>
+          <a:effectRef idx="0">
+            <a:schemeClr val="accent1"/>
+          </a:effectRef>
+          <a:fontRef idx="minor">
+            <a:schemeClr val="lt1"/>
+          </a:fontRef>
+        </p:style>
+        <p:txBody>
+          <a:bodyPr rtlCol="0" anchor="ctr"/>
+          <a:lstStyle/>
+          <a:p>
+            <a:pPr algn="ctr"/>
+            <a:endParaRPr lang="ru-RU"/>
+          </a:p>
+        </p:txBody>
+      </p:sp>
+      <p:sp>
+        <p:nvSpPr>
+          <p:cNvPr id="55" name="Стрелка: влево 54">
+            <a:extLst>
+              <a:ext uri="{FF2B5EF4-FFF2-40B4-BE49-F238E27FC236}">
+                <a16:creationId xmlns:a16="http://schemas.microsoft.com/office/drawing/2014/main" id="{A49F917A-FEFF-8B52-06B4-8F3E779656B7}"/>
+              </a:ext>
+            </a:extLst>
+          </p:cNvPr>
+          <p:cNvSpPr/>
+          <p:nvPr/>
+        </p:nvSpPr>
+        <p:spPr>
+          <a:xfrm rot="15000000" flipH="1">
+            <a:off x="2962836" y="2873447"/>
+            <a:ext cx="1556281" cy="274751"/>
+          </a:xfrm>
+          <a:prstGeom prst="leftArrow">
+            <a:avLst/>
+          </a:prstGeom>
+        </p:spPr>
+        <p:style>
+          <a:lnRef idx="2">
+            <a:schemeClr val="accent1">
+              <a:shade val="15000"/>
+            </a:schemeClr>
+          </a:lnRef>
+          <a:fillRef idx="1">
+            <a:schemeClr val="accent1"/>
+          </a:fillRef>
+          <a:effectRef idx="0">
+            <a:schemeClr val="accent1"/>
+          </a:effectRef>
+          <a:fontRef idx="minor">
+            <a:schemeClr val="lt1"/>
+          </a:fontRef>
+        </p:style>
+        <p:txBody>
+          <a:bodyPr rtlCol="0" anchor="ctr"/>
+          <a:lstStyle/>
+          <a:p>
+            <a:pPr algn="ctr"/>
+            <a:endParaRPr lang="ru-RU"/>
+          </a:p>
+        </p:txBody>
+      </p:sp>
+      <p:sp>
+        <p:nvSpPr>
+          <p:cNvPr id="56" name="Знак умножения 55">
+            <a:extLst>
+              <a:ext uri="{FF2B5EF4-FFF2-40B4-BE49-F238E27FC236}">
+                <a16:creationId xmlns:a16="http://schemas.microsoft.com/office/drawing/2014/main" id="{1EB142DB-3417-572B-F4F6-8F9FD3BDF9FA}"/>
+              </a:ext>
+            </a:extLst>
+          </p:cNvPr>
+          <p:cNvSpPr/>
+          <p:nvPr/>
+        </p:nvSpPr>
+        <p:spPr>
+          <a:xfrm>
+            <a:off x="7963571" y="2593219"/>
+            <a:ext cx="855765" cy="674428"/>
+          </a:xfrm>
+          <a:prstGeom prst="mathMultiply">
+            <a:avLst/>
+          </a:prstGeom>
+          <a:solidFill>
+            <a:srgbClr val="FF0000"/>
+          </a:solidFill>
+        </p:spPr>
+        <p:style>
+          <a:lnRef idx="2">
+            <a:schemeClr val="accent1">
+              <a:shade val="15000"/>
+            </a:schemeClr>
+          </a:lnRef>
+          <a:fillRef idx="1">
+            <a:schemeClr val="accent1"/>
+          </a:fillRef>
+          <a:effectRef idx="0">
+            <a:schemeClr val="accent1"/>
+          </a:effectRef>
+          <a:fontRef idx="minor">
+            <a:schemeClr val="lt1"/>
+          </a:fontRef>
+        </p:style>
+        <p:txBody>
+          <a:bodyPr rtlCol="0" anchor="ctr"/>
+          <a:lstStyle/>
+          <a:p>
+            <a:pPr algn="ctr"/>
+            <a:endParaRPr lang="ru-RU"/>
           </a:p>
         </p:txBody>
       </p:sp>
@@ -5711,6 +7218,183 @@
 </file>
 
 <file path=ppt/slides/slide4.xml><?xml version="1.0" encoding="utf-8"?>
+<p:sld xmlns:a="http://schemas.openxmlformats.org/drawingml/2006/main" xmlns:r="http://schemas.openxmlformats.org/officeDocument/2006/relationships" xmlns:p="http://schemas.openxmlformats.org/presentationml/2006/main">
+  <p:cSld>
+    <p:spTree>
+      <p:nvGrpSpPr>
+        <p:cNvPr id="1" name="">
+          <a:extLst>
+            <a:ext uri="{FF2B5EF4-FFF2-40B4-BE49-F238E27FC236}">
+              <a16:creationId xmlns:a16="http://schemas.microsoft.com/office/drawing/2014/main" id="{B9066A11-83F9-66D8-887D-D5FB038227B5}"/>
+            </a:ext>
+          </a:extLst>
+        </p:cNvPr>
+        <p:cNvGrpSpPr/>
+        <p:nvPr/>
+      </p:nvGrpSpPr>
+      <p:grpSpPr>
+        <a:xfrm>
+          <a:off x="0" y="0"/>
+          <a:ext cx="0" cy="0"/>
+          <a:chOff x="0" y="0"/>
+          <a:chExt cx="0" cy="0"/>
+        </a:xfrm>
+      </p:grpSpPr>
+      <p:sp>
+        <p:nvSpPr>
+          <p:cNvPr id="2" name="Заголовок 1">
+            <a:extLst>
+              <a:ext uri="{FF2B5EF4-FFF2-40B4-BE49-F238E27FC236}">
+                <a16:creationId xmlns:a16="http://schemas.microsoft.com/office/drawing/2014/main" id="{6CA23781-3394-2E38-8EEC-0F6BD627CEA3}"/>
+              </a:ext>
+            </a:extLst>
+          </p:cNvPr>
+          <p:cNvSpPr>
+            <a:spLocks noGrp="1"/>
+          </p:cNvSpPr>
+          <p:nvPr>
+            <p:ph type="ctrTitle"/>
+          </p:nvPr>
+        </p:nvSpPr>
+        <p:spPr>
+          <a:xfrm>
+            <a:off x="1" y="-996"/>
+            <a:ext cx="12179160" cy="758980"/>
+          </a:xfrm>
+        </p:spPr>
+        <p:txBody>
+          <a:bodyPr>
+            <a:normAutofit/>
+          </a:bodyPr>
+          <a:lstStyle/>
+          <a:p>
+            <a:r>
+              <a:rPr lang="ru-RU" sz="4000" b="1"/>
+              <a:t>Object </a:t>
+            </a:r>
+            <a:r>
+              <a:rPr lang="ru-RU" sz="4000" b="1" err="1"/>
+              <a:t>Deletion</a:t>
+            </a:r>
+            <a:r>
+              <a:rPr lang="ru-RU" sz="4000" b="1"/>
+              <a:t> </a:t>
+            </a:r>
+            <a:r>
+              <a:rPr lang="ru-RU" sz="4000" b="1" err="1"/>
+              <a:t>Behavior</a:t>
+            </a:r>
+            <a:endParaRPr lang="ru-RU" sz="4000" b="1"/>
+          </a:p>
+        </p:txBody>
+      </p:sp>
+      <p:sp>
+        <p:nvSpPr>
+          <p:cNvPr id="3" name="Подзаголовок 2">
+            <a:extLst>
+              <a:ext uri="{FF2B5EF4-FFF2-40B4-BE49-F238E27FC236}">
+                <a16:creationId xmlns:a16="http://schemas.microsoft.com/office/drawing/2014/main" id="{E1F6F640-6962-DCF4-FB19-679E1B1C51F9}"/>
+              </a:ext>
+            </a:extLst>
+          </p:cNvPr>
+          <p:cNvSpPr>
+            <a:spLocks noGrp="1"/>
+          </p:cNvSpPr>
+          <p:nvPr>
+            <p:ph type="subTitle" idx="1"/>
+          </p:nvPr>
+        </p:nvSpPr>
+        <p:spPr>
+          <a:xfrm>
+            <a:off x="263406" y="756398"/>
+            <a:ext cx="11648912" cy="5954027"/>
+          </a:xfrm>
+        </p:spPr>
+        <p:txBody>
+          <a:bodyPr vert="horz" lIns="91440" tIns="45720" rIns="91440" bIns="45720" rtlCol="0" anchor="t">
+            <a:normAutofit/>
+          </a:bodyPr>
+          <a:lstStyle/>
+          <a:p>
+            <a:pPr algn="l">
+              <a:lnSpc>
+                <a:spcPct val="100000"/>
+              </a:lnSpc>
+            </a:pPr>
+            <a:br>
+              <a:rPr lang="ru-RU" sz="2800" b="1" dirty="0">
+                <a:ea typeface="+mn-lt"/>
+                <a:cs typeface="+mn-lt"/>
+              </a:rPr>
+            </a:br>
+            <a:r>
+              <a:rPr lang="ru-RU" sz="2800" dirty="0"/>
+              <a:t>Когда объекты  удаляются, они автоматически отвязываются от всех точек связывания (</a:t>
+            </a:r>
+            <a:r>
+              <a:rPr lang="ru-RU" sz="2800" i="1" dirty="0" err="1"/>
+              <a:t>bind</a:t>
+            </a:r>
+            <a:r>
+              <a:rPr lang="ru-RU" sz="2800" i="1" dirty="0"/>
+              <a:t> </a:t>
+            </a:r>
+            <a:r>
+              <a:rPr lang="ru-RU" sz="2800" i="1" dirty="0" err="1"/>
+              <a:t>points</a:t>
+            </a:r>
+            <a:r>
+              <a:rPr lang="ru-RU" sz="2800" dirty="0"/>
+              <a:t>) и от объектов-контейнеров в </a:t>
+            </a:r>
+            <a:r>
+              <a:rPr lang="ru-RU" sz="2800" u="sng" dirty="0"/>
+              <a:t>текущем</a:t>
+            </a:r>
+            <a:r>
+              <a:rPr lang="ru-RU" sz="2800" dirty="0"/>
+              <a:t> контексте. После отвязывания объект не используется при отрисовке (рендеринге).</a:t>
+            </a:r>
+            <a:endParaRPr lang="ru-RU"/>
+          </a:p>
+          <a:p>
+            <a:pPr algn="l">
+              <a:lnSpc>
+                <a:spcPct val="100000"/>
+              </a:lnSpc>
+            </a:pPr>
+            <a:br>
+              <a:rPr lang="ru-RU" sz="2800" dirty="0"/>
+            </a:br>
+            <a:r>
+              <a:rPr lang="ru-RU" sz="2800" dirty="0"/>
+              <a:t>Если при привязке было установлено значение - оно будет выставлено на значение </a:t>
+            </a:r>
+            <a:r>
+              <a:rPr lang="ru-RU" sz="2800" i="1" dirty="0"/>
+              <a:t>по умолчанию</a:t>
+            </a:r>
+            <a:r>
+              <a:rPr lang="ru-RU" sz="2800" dirty="0"/>
+              <a:t>.</a:t>
+            </a:r>
+          </a:p>
+        </p:txBody>
+      </p:sp>
+    </p:spTree>
+    <p:extLst>
+      <p:ext uri="{BB962C8B-B14F-4D97-AF65-F5344CB8AC3E}">
+        <p14:creationId xmlns:p14="http://schemas.microsoft.com/office/powerpoint/2010/main" val="3718848944"/>
+      </p:ext>
+    </p:extLst>
+  </p:cSld>
+  <p:clrMapOvr>
+    <a:masterClrMapping/>
+  </p:clrMapOvr>
+</p:sld>
+</file>
+
+<file path=ppt/slides/slide5.xml><?xml version="1.0" encoding="utf-8"?>
 <p:sld xmlns:a="http://schemas.openxmlformats.org/drawingml/2006/main" xmlns:r="http://schemas.openxmlformats.org/officeDocument/2006/relationships" xmlns:p="http://schemas.openxmlformats.org/presentationml/2006/main">
   <p:cSld>
     <p:spTree>
@@ -6114,7 +7798,7 @@
 </p:sld>
 </file>
 
-<file path=ppt/slides/slide5.xml><?xml version="1.0" encoding="utf-8"?>
+<file path=ppt/slides/slide6.xml><?xml version="1.0" encoding="utf-8"?>
 <p:sld xmlns:a="http://schemas.openxmlformats.org/drawingml/2006/main" xmlns:r="http://schemas.openxmlformats.org/officeDocument/2006/relationships" xmlns:p="http://schemas.openxmlformats.org/presentationml/2006/main">
   <p:cSld>
     <p:spTree>
@@ -6230,31 +7914,587 @@
       </p:sp>
       <p:sp>
         <p:nvSpPr>
-          <p:cNvPr id="3" name="Подзаголовок 2">
+          <p:cNvPr id="4" name="Прямоугольник: скругленные углы 3">
             <a:extLst>
               <a:ext uri="{FF2B5EF4-FFF2-40B4-BE49-F238E27FC236}">
-                <a16:creationId xmlns:a16="http://schemas.microsoft.com/office/drawing/2014/main" id="{D9AACCFF-1218-7F99-07D1-528FED6B3373}"/>
+                <a16:creationId xmlns:a16="http://schemas.microsoft.com/office/drawing/2014/main" id="{D8E44A9D-AF57-1E02-D5C8-907582D64094}"/>
               </a:ext>
             </a:extLst>
           </p:cNvPr>
-          <p:cNvSpPr>
-            <a:spLocks noGrp="1"/>
-          </p:cNvSpPr>
-          <p:nvPr>
-            <p:ph type="subTitle" idx="1"/>
-          </p:nvPr>
+          <p:cNvSpPr/>
+          <p:nvPr/>
         </p:nvSpPr>
         <p:spPr>
           <a:xfrm>
-            <a:off x="182028" y="864435"/>
-            <a:ext cx="11838470" cy="5845989"/>
+            <a:off x="4069248" y="1497884"/>
+            <a:ext cx="3749301" cy="859353"/>
           </a:xfrm>
+          <a:prstGeom prst="roundRect">
+            <a:avLst/>
+          </a:prstGeom>
+          <a:solidFill>
+            <a:schemeClr val="accent4">
+              <a:lumMod val="40000"/>
+              <a:lumOff val="60000"/>
+            </a:schemeClr>
+          </a:solidFill>
         </p:spPr>
+        <p:style>
+          <a:lnRef idx="2">
+            <a:schemeClr val="accent1">
+              <a:shade val="15000"/>
+            </a:schemeClr>
+          </a:lnRef>
+          <a:fillRef idx="1">
+            <a:schemeClr val="accent1"/>
+          </a:fillRef>
+          <a:effectRef idx="0">
+            <a:schemeClr val="accent1"/>
+          </a:effectRef>
+          <a:fontRef idx="minor">
+            <a:schemeClr val="lt1"/>
+          </a:fontRef>
+        </p:style>
+        <p:txBody>
+          <a:bodyPr rtlCol="0" anchor="ctr"/>
+          <a:lstStyle/>
+          <a:p>
+            <a:pPr algn="ctr"/>
+            <a:r>
+              <a:rPr lang="ru-RU" sz="3600" b="1" dirty="0">
+                <a:solidFill>
+                  <a:schemeClr val="tx1"/>
+                </a:solidFill>
+              </a:rPr>
+              <a:t>Объект OpenGL</a:t>
+            </a:r>
+          </a:p>
+        </p:txBody>
+      </p:sp>
+      <p:sp>
+        <p:nvSpPr>
+          <p:cNvPr id="6" name="Прямоугольник: скругленные углы 5">
+            <a:extLst>
+              <a:ext uri="{FF2B5EF4-FFF2-40B4-BE49-F238E27FC236}">
+                <a16:creationId xmlns:a16="http://schemas.microsoft.com/office/drawing/2014/main" id="{1B0B7B7E-E342-745C-E504-E3E8DA1E9819}"/>
+              </a:ext>
+            </a:extLst>
+          </p:cNvPr>
+          <p:cNvSpPr/>
+          <p:nvPr/>
+        </p:nvSpPr>
+        <p:spPr>
+          <a:xfrm>
+            <a:off x="153427" y="3361533"/>
+            <a:ext cx="4450202" cy="2534817"/>
+          </a:xfrm>
+          <a:prstGeom prst="roundRect">
+            <a:avLst/>
+          </a:prstGeom>
+          <a:solidFill>
+            <a:schemeClr val="accent6">
+              <a:lumMod val="60000"/>
+              <a:lumOff val="40000"/>
+            </a:schemeClr>
+          </a:solidFill>
+        </p:spPr>
+        <p:style>
+          <a:lnRef idx="2">
+            <a:schemeClr val="accent1">
+              <a:shade val="15000"/>
+            </a:schemeClr>
+          </a:lnRef>
+          <a:fillRef idx="1">
+            <a:schemeClr val="accent1"/>
+          </a:fillRef>
+          <a:effectRef idx="0">
+            <a:schemeClr val="accent1"/>
+          </a:effectRef>
+          <a:fontRef idx="minor">
+            <a:schemeClr val="lt1"/>
+          </a:fontRef>
+        </p:style>
+        <p:txBody>
+          <a:bodyPr lIns="91440" tIns="45720" rIns="91440" bIns="45720" rtlCol="0" anchor="ctr"/>
+          <a:lstStyle/>
+          <a:p>
+            <a:pPr algn="ctr"/>
+            <a:r>
+              <a:rPr lang="ru-RU" sz="2800" b="1" dirty="0">
+                <a:solidFill>
+                  <a:schemeClr val="tx1"/>
+                </a:solidFill>
+              </a:rPr>
+              <a:t>информация, которую реализации GL не требуется проверять и которая не оказывает оперативного воздействия.</a:t>
+            </a:r>
+            <a:endParaRPr lang="ru-RU" b="1">
+              <a:solidFill>
+                <a:schemeClr val="tx1"/>
+              </a:solidFill>
+            </a:endParaRPr>
+          </a:p>
+        </p:txBody>
+      </p:sp>
+      <p:sp>
+        <p:nvSpPr>
+          <p:cNvPr id="9" name="Прямоугольник: скругленные углы 8">
+            <a:extLst>
+              <a:ext uri="{FF2B5EF4-FFF2-40B4-BE49-F238E27FC236}">
+                <a16:creationId xmlns:a16="http://schemas.microsoft.com/office/drawing/2014/main" id="{3E06A21E-7A8F-0D4C-EAB9-0FFCF09299B1}"/>
+              </a:ext>
+            </a:extLst>
+          </p:cNvPr>
+          <p:cNvSpPr/>
+          <p:nvPr/>
+        </p:nvSpPr>
+        <p:spPr>
+          <a:xfrm>
+            <a:off x="7821054" y="2667569"/>
+            <a:ext cx="3824272" cy="554977"/>
+          </a:xfrm>
+          <a:prstGeom prst="roundRect">
+            <a:avLst/>
+          </a:prstGeom>
+          <a:solidFill>
+            <a:schemeClr val="accent2">
+              <a:lumMod val="60000"/>
+              <a:lumOff val="40000"/>
+            </a:schemeClr>
+          </a:solidFill>
+        </p:spPr>
+        <p:style>
+          <a:lnRef idx="2">
+            <a:schemeClr val="accent1">
+              <a:shade val="15000"/>
+            </a:schemeClr>
+          </a:lnRef>
+          <a:fillRef idx="1">
+            <a:schemeClr val="accent1"/>
+          </a:fillRef>
+          <a:effectRef idx="0">
+            <a:schemeClr val="accent1"/>
+          </a:effectRef>
+          <a:fontRef idx="minor">
+            <a:schemeClr val="lt1"/>
+          </a:fontRef>
+        </p:style>
+        <p:txBody>
+          <a:bodyPr lIns="91440" tIns="45720" rIns="91440" bIns="45720" rtlCol="0" anchor="ctr"/>
+          <a:lstStyle/>
+          <a:p>
+            <a:pPr algn="ctr"/>
+            <a:r>
+              <a:rPr lang="ru-RU" sz="3600" b="1" dirty="0">
+                <a:solidFill>
+                  <a:schemeClr val="tx1"/>
+                </a:solidFill>
+              </a:rPr>
+              <a:t>Состояние</a:t>
+            </a:r>
+          </a:p>
+        </p:txBody>
+      </p:sp>
+      <p:sp>
+        <p:nvSpPr>
+          <p:cNvPr id="11" name="Стрелка: влево 10">
+            <a:extLst>
+              <a:ext uri="{FF2B5EF4-FFF2-40B4-BE49-F238E27FC236}">
+                <a16:creationId xmlns:a16="http://schemas.microsoft.com/office/drawing/2014/main" id="{ADE83E86-6528-6FBC-3DEB-65E6F5C4A182}"/>
+              </a:ext>
+            </a:extLst>
+          </p:cNvPr>
+          <p:cNvSpPr/>
+          <p:nvPr/>
+        </p:nvSpPr>
+        <p:spPr>
+          <a:xfrm rot="18840000">
+            <a:off x="3831039" y="2256871"/>
+            <a:ext cx="467813" cy="538638"/>
+          </a:xfrm>
+          <a:prstGeom prst="leftArrow">
+            <a:avLst/>
+          </a:prstGeom>
+        </p:spPr>
+        <p:style>
+          <a:lnRef idx="2">
+            <a:schemeClr val="accent1">
+              <a:shade val="15000"/>
+            </a:schemeClr>
+          </a:lnRef>
+          <a:fillRef idx="1">
+            <a:schemeClr val="accent1"/>
+          </a:fillRef>
+          <a:effectRef idx="0">
+            <a:schemeClr val="accent1"/>
+          </a:effectRef>
+          <a:fontRef idx="minor">
+            <a:schemeClr val="lt1"/>
+          </a:fontRef>
+        </p:style>
+        <p:txBody>
+          <a:bodyPr rtlCol="0" anchor="ctr"/>
+          <a:lstStyle/>
+          <a:p>
+            <a:pPr algn="ctr"/>
+            <a:endParaRPr lang="ru-RU"/>
+          </a:p>
+        </p:txBody>
+      </p:sp>
+      <p:sp>
+        <p:nvSpPr>
+          <p:cNvPr id="12" name="Стрелка: влево 11">
+            <a:extLst>
+              <a:ext uri="{FF2B5EF4-FFF2-40B4-BE49-F238E27FC236}">
+                <a16:creationId xmlns:a16="http://schemas.microsoft.com/office/drawing/2014/main" id="{FA7B4646-5048-3B4C-D1B6-3D12FB59EB1A}"/>
+              </a:ext>
+            </a:extLst>
+          </p:cNvPr>
+          <p:cNvSpPr/>
+          <p:nvPr/>
+        </p:nvSpPr>
+        <p:spPr>
+          <a:xfrm rot="13980000">
+            <a:off x="7582450" y="2256584"/>
+            <a:ext cx="467813" cy="538638"/>
+          </a:xfrm>
+          <a:prstGeom prst="leftArrow">
+            <a:avLst/>
+          </a:prstGeom>
+        </p:spPr>
+        <p:style>
+          <a:lnRef idx="2">
+            <a:schemeClr val="accent1">
+              <a:shade val="15000"/>
+            </a:schemeClr>
+          </a:lnRef>
+          <a:fillRef idx="1">
+            <a:schemeClr val="accent1"/>
+          </a:fillRef>
+          <a:effectRef idx="0">
+            <a:schemeClr val="accent1"/>
+          </a:effectRef>
+          <a:fontRef idx="minor">
+            <a:schemeClr val="lt1"/>
+          </a:fontRef>
+        </p:style>
+        <p:txBody>
+          <a:bodyPr rtlCol="0" anchor="ctr"/>
+          <a:lstStyle/>
+          <a:p>
+            <a:pPr algn="ctr"/>
+            <a:endParaRPr lang="ru-RU"/>
+          </a:p>
+        </p:txBody>
+      </p:sp>
+      <p:sp>
+        <p:nvSpPr>
+          <p:cNvPr id="14" name="Прямоугольник: скругленные углы 13">
+            <a:extLst>
+              <a:ext uri="{FF2B5EF4-FFF2-40B4-BE49-F238E27FC236}">
+                <a16:creationId xmlns:a16="http://schemas.microsoft.com/office/drawing/2014/main" id="{99407776-2F61-4C26-E6E1-EAD63F22A242}"/>
+              </a:ext>
+            </a:extLst>
+          </p:cNvPr>
+          <p:cNvSpPr/>
+          <p:nvPr/>
+        </p:nvSpPr>
+        <p:spPr>
+          <a:xfrm>
+            <a:off x="466390" y="2667569"/>
+            <a:ext cx="3599755" cy="554977"/>
+          </a:xfrm>
+          <a:prstGeom prst="roundRect">
+            <a:avLst/>
+          </a:prstGeom>
+          <a:solidFill>
+            <a:schemeClr val="accent6">
+              <a:lumMod val="60000"/>
+              <a:lumOff val="40000"/>
+            </a:schemeClr>
+          </a:solidFill>
+        </p:spPr>
+        <p:style>
+          <a:lnRef idx="2">
+            <a:schemeClr val="accent1">
+              <a:shade val="15000"/>
+            </a:schemeClr>
+          </a:lnRef>
+          <a:fillRef idx="1">
+            <a:schemeClr val="accent1"/>
+          </a:fillRef>
+          <a:effectRef idx="0">
+            <a:schemeClr val="accent1"/>
+          </a:effectRef>
+          <a:fontRef idx="minor">
+            <a:schemeClr val="lt1"/>
+          </a:fontRef>
+        </p:style>
+        <p:txBody>
+          <a:bodyPr lIns="91440" tIns="45720" rIns="91440" bIns="45720" rtlCol="0" anchor="ctr"/>
+          <a:lstStyle/>
+          <a:p>
+            <a:pPr algn="ctr"/>
+            <a:r>
+              <a:rPr lang="ru-RU" sz="3600" b="1" dirty="0">
+                <a:solidFill>
+                  <a:schemeClr val="tx1"/>
+                </a:solidFill>
+              </a:rPr>
+              <a:t>Данные</a:t>
+            </a:r>
+          </a:p>
+        </p:txBody>
+      </p:sp>
+      <p:sp>
+        <p:nvSpPr>
+          <p:cNvPr id="15" name="Прямоугольник: скругленные углы 14">
+            <a:extLst>
+              <a:ext uri="{FF2B5EF4-FFF2-40B4-BE49-F238E27FC236}">
+                <a16:creationId xmlns:a16="http://schemas.microsoft.com/office/drawing/2014/main" id="{6D807D57-E422-1199-3AAC-AF4CC094ED6F}"/>
+              </a:ext>
+            </a:extLst>
+          </p:cNvPr>
+          <p:cNvSpPr/>
+          <p:nvPr/>
+        </p:nvSpPr>
+        <p:spPr>
+          <a:xfrm>
+            <a:off x="7473146" y="3361533"/>
+            <a:ext cx="4519162" cy="2534817"/>
+          </a:xfrm>
+          <a:prstGeom prst="roundRect">
+            <a:avLst/>
+          </a:prstGeom>
+          <a:solidFill>
+            <a:schemeClr val="accent2">
+              <a:lumMod val="60000"/>
+              <a:lumOff val="40000"/>
+            </a:schemeClr>
+          </a:solidFill>
+        </p:spPr>
+        <p:style>
+          <a:lnRef idx="2">
+            <a:schemeClr val="accent1">
+              <a:shade val="15000"/>
+            </a:schemeClr>
+          </a:lnRef>
+          <a:fillRef idx="1">
+            <a:schemeClr val="accent1"/>
+          </a:fillRef>
+          <a:effectRef idx="0">
+            <a:schemeClr val="accent1"/>
+          </a:effectRef>
+          <a:fontRef idx="minor">
+            <a:schemeClr val="lt1"/>
+          </a:fontRef>
+        </p:style>
+        <p:txBody>
+          <a:bodyPr lIns="91440" tIns="45720" rIns="91440" bIns="45720" rtlCol="0" anchor="ctr"/>
+          <a:lstStyle/>
+          <a:p>
+            <a:pPr algn="ctr"/>
+            <a:r>
+              <a:rPr lang="ru-RU" sz="2800" b="1" dirty="0">
+                <a:solidFill>
+                  <a:schemeClr val="tx1"/>
+                </a:solidFill>
+              </a:rPr>
+              <a:t>определяет конфигурацию конвейера рендеринга, и реализации GL требуется  проверять состояние.</a:t>
+            </a:r>
+          </a:p>
+        </p:txBody>
+      </p:sp>
+      <p:sp>
+        <p:nvSpPr>
+          <p:cNvPr id="17" name="Подзаголовок 2">
+            <a:extLst>
+              <a:ext uri="{FF2B5EF4-FFF2-40B4-BE49-F238E27FC236}">
+                <a16:creationId xmlns:a16="http://schemas.microsoft.com/office/drawing/2014/main" id="{3FC74E7E-F46B-E042-A59B-AE3E782CE5BF}"/>
+              </a:ext>
+            </a:extLst>
+          </p:cNvPr>
+          <p:cNvSpPr txBox="1">
+            <a:spLocks/>
+          </p:cNvSpPr>
+          <p:nvPr/>
+        </p:nvSpPr>
+        <p:spPr>
+          <a:xfrm>
+            <a:off x="182027" y="734204"/>
+            <a:ext cx="11456563" cy="657018"/>
+          </a:xfrm>
+          <a:prstGeom prst="rect">
+            <a:avLst/>
+          </a:prstGeom>
+        </p:spPr>
         <p:txBody>
           <a:bodyPr vert="horz" lIns="91440" tIns="45720" rIns="91440" bIns="45720" rtlCol="0" anchor="t">
-            <a:normAutofit/>
+            <a:normAutofit fontScale="85000" lnSpcReduction="10000"/>
           </a:bodyPr>
-          <a:lstStyle/>
+          <a:lstStyle>
+            <a:lvl1pPr marL="0" indent="0" algn="ctr" defTabSz="914400" rtl="0" eaLnBrk="1" latinLnBrk="0" hangingPunct="1">
+              <a:lnSpc>
+                <a:spcPct val="90000"/>
+              </a:lnSpc>
+              <a:spcBef>
+                <a:spcPts val="1000"/>
+              </a:spcBef>
+              <a:buFont typeface="Arial" panose="020B0604020202020204" pitchFamily="34" charset="0"/>
+              <a:buNone/>
+              <a:defRPr sz="2400" kern="1200">
+                <a:solidFill>
+                  <a:schemeClr val="tx1"/>
+                </a:solidFill>
+                <a:latin typeface="+mn-lt"/>
+                <a:ea typeface="+mn-ea"/>
+                <a:cs typeface="+mn-cs"/>
+              </a:defRPr>
+            </a:lvl1pPr>
+            <a:lvl2pPr marL="457200" indent="0" algn="ctr" defTabSz="914400" rtl="0" eaLnBrk="1" latinLnBrk="0" hangingPunct="1">
+              <a:lnSpc>
+                <a:spcPct val="90000"/>
+              </a:lnSpc>
+              <a:spcBef>
+                <a:spcPts val="500"/>
+              </a:spcBef>
+              <a:buFont typeface="Arial" panose="020B0604020202020204" pitchFamily="34" charset="0"/>
+              <a:buNone/>
+              <a:defRPr sz="2000" kern="1200">
+                <a:solidFill>
+                  <a:schemeClr val="tx1"/>
+                </a:solidFill>
+                <a:latin typeface="+mn-lt"/>
+                <a:ea typeface="+mn-ea"/>
+                <a:cs typeface="+mn-cs"/>
+              </a:defRPr>
+            </a:lvl2pPr>
+            <a:lvl3pPr marL="914400" indent="0" algn="ctr" defTabSz="914400" rtl="0" eaLnBrk="1" latinLnBrk="0" hangingPunct="1">
+              <a:lnSpc>
+                <a:spcPct val="90000"/>
+              </a:lnSpc>
+              <a:spcBef>
+                <a:spcPts val="500"/>
+              </a:spcBef>
+              <a:buFont typeface="Arial" panose="020B0604020202020204" pitchFamily="34" charset="0"/>
+              <a:buNone/>
+              <a:defRPr sz="1800" kern="1200">
+                <a:solidFill>
+                  <a:schemeClr val="tx1"/>
+                </a:solidFill>
+                <a:latin typeface="+mn-lt"/>
+                <a:ea typeface="+mn-ea"/>
+                <a:cs typeface="+mn-cs"/>
+              </a:defRPr>
+            </a:lvl3pPr>
+            <a:lvl4pPr marL="1371600" indent="0" algn="ctr" defTabSz="914400" rtl="0" eaLnBrk="1" latinLnBrk="0" hangingPunct="1">
+              <a:lnSpc>
+                <a:spcPct val="90000"/>
+              </a:lnSpc>
+              <a:spcBef>
+                <a:spcPts val="500"/>
+              </a:spcBef>
+              <a:buFont typeface="Arial" panose="020B0604020202020204" pitchFamily="34" charset="0"/>
+              <a:buNone/>
+              <a:defRPr sz="1600" kern="1200">
+                <a:solidFill>
+                  <a:schemeClr val="tx1"/>
+                </a:solidFill>
+                <a:latin typeface="+mn-lt"/>
+                <a:ea typeface="+mn-ea"/>
+                <a:cs typeface="+mn-cs"/>
+              </a:defRPr>
+            </a:lvl4pPr>
+            <a:lvl5pPr marL="1828800" indent="0" algn="ctr" defTabSz="914400" rtl="0" eaLnBrk="1" latinLnBrk="0" hangingPunct="1">
+              <a:lnSpc>
+                <a:spcPct val="90000"/>
+              </a:lnSpc>
+              <a:spcBef>
+                <a:spcPts val="500"/>
+              </a:spcBef>
+              <a:buFont typeface="Arial" panose="020B0604020202020204" pitchFamily="34" charset="0"/>
+              <a:buNone/>
+              <a:defRPr sz="1600" kern="1200">
+                <a:solidFill>
+                  <a:schemeClr val="tx1"/>
+                </a:solidFill>
+                <a:latin typeface="+mn-lt"/>
+                <a:ea typeface="+mn-ea"/>
+                <a:cs typeface="+mn-cs"/>
+              </a:defRPr>
+            </a:lvl5pPr>
+            <a:lvl6pPr marL="2286000" indent="0" algn="ctr" defTabSz="914400" rtl="0" eaLnBrk="1" latinLnBrk="0" hangingPunct="1">
+              <a:lnSpc>
+                <a:spcPct val="90000"/>
+              </a:lnSpc>
+              <a:spcBef>
+                <a:spcPts val="500"/>
+              </a:spcBef>
+              <a:buFont typeface="Arial" panose="020B0604020202020204" pitchFamily="34" charset="0"/>
+              <a:buNone/>
+              <a:defRPr sz="1600" kern="1200">
+                <a:solidFill>
+                  <a:schemeClr val="tx1"/>
+                </a:solidFill>
+                <a:latin typeface="+mn-lt"/>
+                <a:ea typeface="+mn-ea"/>
+                <a:cs typeface="+mn-cs"/>
+              </a:defRPr>
+            </a:lvl6pPr>
+            <a:lvl7pPr marL="2743200" indent="0" algn="ctr" defTabSz="914400" rtl="0" eaLnBrk="1" latinLnBrk="0" hangingPunct="1">
+              <a:lnSpc>
+                <a:spcPct val="90000"/>
+              </a:lnSpc>
+              <a:spcBef>
+                <a:spcPts val="500"/>
+              </a:spcBef>
+              <a:buFont typeface="Arial" panose="020B0604020202020204" pitchFamily="34" charset="0"/>
+              <a:buNone/>
+              <a:defRPr sz="1600" kern="1200">
+                <a:solidFill>
+                  <a:schemeClr val="tx1"/>
+                </a:solidFill>
+                <a:latin typeface="+mn-lt"/>
+                <a:ea typeface="+mn-ea"/>
+                <a:cs typeface="+mn-cs"/>
+              </a:defRPr>
+            </a:lvl7pPr>
+            <a:lvl8pPr marL="3200400" indent="0" algn="ctr" defTabSz="914400" rtl="0" eaLnBrk="1" latinLnBrk="0" hangingPunct="1">
+              <a:lnSpc>
+                <a:spcPct val="90000"/>
+              </a:lnSpc>
+              <a:spcBef>
+                <a:spcPts val="500"/>
+              </a:spcBef>
+              <a:buFont typeface="Arial" panose="020B0604020202020204" pitchFamily="34" charset="0"/>
+              <a:buNone/>
+              <a:defRPr sz="1600" kern="1200">
+                <a:solidFill>
+                  <a:schemeClr val="tx1"/>
+                </a:solidFill>
+                <a:latin typeface="+mn-lt"/>
+                <a:ea typeface="+mn-ea"/>
+                <a:cs typeface="+mn-cs"/>
+              </a:defRPr>
+            </a:lvl8pPr>
+            <a:lvl9pPr marL="3657600" indent="0" algn="ctr" defTabSz="914400" rtl="0" eaLnBrk="1" latinLnBrk="0" hangingPunct="1">
+              <a:lnSpc>
+                <a:spcPct val="90000"/>
+              </a:lnSpc>
+              <a:spcBef>
+                <a:spcPts val="500"/>
+              </a:spcBef>
+              <a:buFont typeface="Arial" panose="020B0604020202020204" pitchFamily="34" charset="0"/>
+              <a:buNone/>
+              <a:defRPr sz="1600" kern="1200">
+                <a:solidFill>
+                  <a:schemeClr val="tx1"/>
+                </a:solidFill>
+                <a:latin typeface="+mn-lt"/>
+                <a:ea typeface="+mn-ea"/>
+                <a:cs typeface="+mn-cs"/>
+              </a:defRPr>
+            </a:lvl9pPr>
+          </a:lstStyle>
           <a:p>
             <a:pPr algn="l">
               <a:lnSpc>
@@ -6262,24 +8502,31 @@
               </a:lnSpc>
             </a:pPr>
             <a:r>
-              <a:rPr lang="ru-RU" sz="2800">
+              <a:rPr lang="ru-RU" sz="2800" dirty="0">
+                <a:ea typeface="+mn-lt"/>
+                <a:cs typeface="+mn-lt"/>
+              </a:rPr>
+              <a:t>Каждый объект OpenGL содержит 2 типа информации:</a:t>
+            </a:r>
+            <a:r>
+              <a:rPr lang="ru-RU" sz="2800" dirty="0">
                 <a:solidFill>
                   <a:srgbClr val="212529"/>
                 </a:solidFill>
                 <a:ea typeface="+mn-lt"/>
                 <a:cs typeface="+mn-lt"/>
               </a:rPr>
-              <a:t>Каждый объект OpenGL содержит 2 типа информации: </a:t>
-            </a:r>
-            <a:r>
-              <a:rPr lang="ru-RU" sz="2800" b="1">
+              <a:t> </a:t>
+            </a:r>
+            <a:r>
+              <a:rPr lang="ru-RU" sz="2800" b="1" dirty="0">
                 <a:ea typeface="+mn-lt"/>
                 <a:cs typeface="+mn-lt"/>
               </a:rPr>
               <a:t>данные </a:t>
             </a:r>
             <a:r>
-              <a:rPr lang="ru-RU" sz="2800">
+              <a:rPr lang="ru-RU" sz="2800" dirty="0">
                 <a:solidFill>
                   <a:srgbClr val="212529"/>
                 </a:solidFill>
@@ -6289,7 +8536,7 @@
               <a:t>и </a:t>
             </a:r>
             <a:r>
-              <a:rPr lang="ru-RU" sz="2800" b="1">
+              <a:rPr lang="ru-RU" sz="2800" b="1" dirty="0">
                 <a:solidFill>
                   <a:srgbClr val="212529"/>
                 </a:solidFill>
@@ -6299,7 +8546,7 @@
               <a:t>состояние</a:t>
             </a:r>
             <a:r>
-              <a:rPr lang="ru-RU" sz="2800">
+              <a:rPr lang="ru-RU" sz="2800" dirty="0">
                 <a:solidFill>
                   <a:srgbClr val="212529"/>
                 </a:solidFill>
@@ -6308,102 +8555,7 @@
               </a:rPr>
               <a:t>. </a:t>
             </a:r>
-            <a:endParaRPr lang="ru-RU"/>
-          </a:p>
-          <a:p>
-            <a:pPr algn="l">
-              <a:lnSpc>
-                <a:spcPct val="100000"/>
-              </a:lnSpc>
-            </a:pPr>
-            <a:br>
-              <a:rPr lang="ru-RU" sz="2800">
-                <a:solidFill>
-                  <a:srgbClr val="212529"/>
-                </a:solidFill>
-                <a:ea typeface="+mn-lt"/>
-                <a:cs typeface="+mn-lt"/>
-              </a:rPr>
-            </a:br>
-            <a:r>
-              <a:rPr lang="ru-RU" sz="2800" b="1">
-                <a:solidFill>
-                  <a:srgbClr val="212529"/>
-                </a:solidFill>
-                <a:ea typeface="+mn-lt"/>
-                <a:cs typeface="+mn-lt"/>
-              </a:rPr>
-              <a:t>Данные </a:t>
-            </a:r>
-            <a:r>
-              <a:rPr lang="ru-RU" sz="2800">
-                <a:solidFill>
-                  <a:srgbClr val="212529"/>
-                </a:solidFill>
-                <a:ea typeface="+mn-lt"/>
-                <a:cs typeface="+mn-lt"/>
-              </a:rPr>
-              <a:t>- информация, которую реализации GL не требуется проверять и которая не оказывает оперативного воздействия.</a:t>
-            </a:r>
-            <a:endParaRPr lang="ru-RU"/>
-          </a:p>
-          <a:p>
-            <a:pPr algn="l">
-              <a:lnSpc>
-                <a:spcPct val="100000"/>
-              </a:lnSpc>
-            </a:pPr>
-            <a:r>
-              <a:rPr lang="ru-RU" sz="2800" b="1">
-                <a:solidFill>
-                  <a:srgbClr val="212529"/>
-                </a:solidFill>
-                <a:ea typeface="+mn-lt"/>
-                <a:cs typeface="+mn-lt"/>
-              </a:rPr>
-              <a:t>Состояние </a:t>
-            </a:r>
-            <a:r>
-              <a:rPr lang="ru-RU" sz="2800">
-                <a:solidFill>
-                  <a:srgbClr val="212529"/>
-                </a:solidFill>
-                <a:ea typeface="+mn-lt"/>
-                <a:cs typeface="+mn-lt"/>
-              </a:rPr>
-              <a:t>- то, что определяет конфигурацию конвейера рендеринга, и реализации GL требуется  проверять состояние.</a:t>
-            </a:r>
-          </a:p>
-          <a:p>
-            <a:pPr algn="l">
-              <a:lnSpc>
-                <a:spcPct val="100000"/>
-              </a:lnSpc>
-            </a:pPr>
-            <a:endParaRPr lang="ru-RU" sz="2800">
-              <a:solidFill>
-                <a:srgbClr val="212529"/>
-              </a:solidFill>
-              <a:ea typeface="+mn-lt"/>
-              <a:cs typeface="+mn-lt"/>
-            </a:endParaRPr>
-          </a:p>
-          <a:p>
-            <a:pPr algn="l">
-              <a:lnSpc>
-                <a:spcPct val="100000"/>
-              </a:lnSpc>
-            </a:pPr>
-            <a:r>
-              <a:rPr lang="ru-RU" sz="2800">
-                <a:solidFill>
-                  <a:srgbClr val="212529"/>
-                </a:solidFill>
-                <a:ea typeface="+mn-lt"/>
-                <a:cs typeface="+mn-lt"/>
-              </a:rPr>
-              <a:t>Когда содержимое объекта изменяется, не всегда сразу видны изменения и не всегда сразу влияют на операции OpenGL.</a:t>
-            </a:r>
+            <a:endParaRPr lang="ru-RU" dirty="0"/>
           </a:p>
         </p:txBody>
       </p:sp>
@@ -6420,7 +8572,7 @@
 </p:sld>
 </file>
 
-<file path=ppt/slides/slide6.xml><?xml version="1.0" encoding="utf-8"?>
+<file path=ppt/slides/slide7.xml><?xml version="1.0" encoding="utf-8"?>
 <p:sld xmlns:a="http://schemas.openxmlformats.org/drawingml/2006/main" xmlns:r="http://schemas.openxmlformats.org/officeDocument/2006/relationships" xmlns:p="http://schemas.openxmlformats.org/presentationml/2006/main">
   <p:cSld>
     <p:spTree>
@@ -6928,6 +9080,118 @@
     <p:extLst>
       <p:ext uri="{BB962C8B-B14F-4D97-AF65-F5344CB8AC3E}">
         <p14:creationId xmlns:p14="http://schemas.microsoft.com/office/powerpoint/2010/main" val="1998201513"/>
+      </p:ext>
+    </p:extLst>
+  </p:cSld>
+  <p:clrMapOvr>
+    <a:masterClrMapping/>
+  </p:clrMapOvr>
+</p:sld>
+</file>
+
+<file path=ppt/slides/slide8.xml><?xml version="1.0" encoding="utf-8"?>
+<p:sld xmlns:a="http://schemas.openxmlformats.org/drawingml/2006/main" xmlns:r="http://schemas.openxmlformats.org/officeDocument/2006/relationships" xmlns:p="http://schemas.openxmlformats.org/presentationml/2006/main">
+  <p:cSld>
+    <p:spTree>
+      <p:nvGrpSpPr>
+        <p:cNvPr id="1" name="">
+          <a:extLst>
+            <a:ext uri="{FF2B5EF4-FFF2-40B4-BE49-F238E27FC236}">
+              <a16:creationId xmlns:a16="http://schemas.microsoft.com/office/drawing/2014/main" id="{E0F628AD-3C8F-287E-5F27-A84957C5D3EF}"/>
+            </a:ext>
+          </a:extLst>
+        </p:cNvPr>
+        <p:cNvGrpSpPr/>
+        <p:nvPr/>
+      </p:nvGrpSpPr>
+      <p:grpSpPr>
+        <a:xfrm>
+          <a:off x="0" y="0"/>
+          <a:ext cx="0" cy="0"/>
+          <a:chOff x="0" y="0"/>
+          <a:chExt cx="0" cy="0"/>
+        </a:xfrm>
+      </p:grpSpPr>
+      <p:sp>
+        <p:nvSpPr>
+          <p:cNvPr id="2" name="Заголовок 1">
+            <a:extLst>
+              <a:ext uri="{FF2B5EF4-FFF2-40B4-BE49-F238E27FC236}">
+                <a16:creationId xmlns:a16="http://schemas.microsoft.com/office/drawing/2014/main" id="{66F4BCC3-4A31-4AFB-4282-9CA5733D2A62}"/>
+              </a:ext>
+            </a:extLst>
+          </p:cNvPr>
+          <p:cNvSpPr>
+            <a:spLocks noGrp="1"/>
+          </p:cNvSpPr>
+          <p:nvPr>
+            <p:ph type="ctrTitle"/>
+          </p:nvPr>
+        </p:nvSpPr>
+        <p:spPr>
+          <a:xfrm>
+            <a:off x="1" y="-996"/>
+            <a:ext cx="12193537" cy="687092"/>
+          </a:xfrm>
+        </p:spPr>
+        <p:txBody>
+          <a:bodyPr>
+            <a:normAutofit/>
+          </a:bodyPr>
+          <a:lstStyle/>
+          <a:p>
+            <a:r>
+              <a:rPr lang="ru-RU" sz="4000" b="1" dirty="0">
+                <a:solidFill>
+                  <a:srgbClr val="000000"/>
+                </a:solidFill>
+                <a:ea typeface="+mj-lt"/>
+                <a:cs typeface="+mj-lt"/>
+              </a:rPr>
+              <a:t>Спасибо за внимание</a:t>
+            </a:r>
+            <a:endParaRPr lang="ru-RU">
+              <a:solidFill>
+                <a:srgbClr val="000000"/>
+              </a:solidFill>
+            </a:endParaRPr>
+          </a:p>
+        </p:txBody>
+      </p:sp>
+      <p:pic>
+        <p:nvPicPr>
+          <p:cNvPr id="5" name="Рисунок 4">
+            <a:extLst>
+              <a:ext uri="{FF2B5EF4-FFF2-40B4-BE49-F238E27FC236}">
+                <a16:creationId xmlns:a16="http://schemas.microsoft.com/office/drawing/2014/main" id="{5F916700-29FC-FA05-7AAE-660784E842C4}"/>
+              </a:ext>
+            </a:extLst>
+          </p:cNvPr>
+          <p:cNvPicPr>
+            <a:picLocks noChangeAspect="1"/>
+          </p:cNvPicPr>
+          <p:nvPr/>
+        </p:nvPicPr>
+        <p:blipFill>
+          <a:blip r:embed="rId2"/>
+          <a:stretch>
+            <a:fillRect/>
+          </a:stretch>
+        </p:blipFill>
+        <p:spPr>
+          <a:xfrm>
+            <a:off x="3415083" y="687372"/>
+            <a:ext cx="5361835" cy="5867954"/>
+          </a:xfrm>
+          <a:prstGeom prst="rect">
+            <a:avLst/>
+          </a:prstGeom>
+        </p:spPr>
+      </p:pic>
+    </p:spTree>
+    <p:extLst>
+      <p:ext uri="{BB962C8B-B14F-4D97-AF65-F5344CB8AC3E}">
+        <p14:creationId xmlns:p14="http://schemas.microsoft.com/office/powerpoint/2010/main" val="863713459"/>
       </p:ext>
     </p:extLst>
   </p:cSld>

</xml_diff>